<commit_message>
Add some stofe to presentation
</commit_message>
<xml_diff>
--- a/Patientenverwaltung v3.0/Präsi/Patientenverwaltung.pptx
+++ b/Patientenverwaltung v3.0/Präsi/Patientenverwaltung.pptx
@@ -5,27 +5,30 @@
     <p:sldMasterId id="2147483648" r:id="rId1"/>
   </p:sldMasterIdLst>
   <p:notesMasterIdLst>
-    <p:notesMasterId r:id="rId15"/>
+    <p:notesMasterId r:id="rId18"/>
   </p:notesMasterIdLst>
   <p:handoutMasterIdLst>
-    <p:handoutMasterId r:id="rId16"/>
+    <p:handoutMasterId r:id="rId19"/>
   </p:handoutMasterIdLst>
   <p:sldIdLst>
     <p:sldId id="268" r:id="rId2"/>
     <p:sldId id="257" r:id="rId3"/>
     <p:sldId id="258" r:id="rId4"/>
     <p:sldId id="259" r:id="rId5"/>
-    <p:sldId id="260" r:id="rId6"/>
-    <p:sldId id="261" r:id="rId7"/>
-    <p:sldId id="262" r:id="rId8"/>
-    <p:sldId id="263" r:id="rId9"/>
-    <p:sldId id="264" r:id="rId10"/>
-    <p:sldId id="265" r:id="rId11"/>
-    <p:sldId id="266" r:id="rId12"/>
-    <p:sldId id="267" r:id="rId13"/>
-    <p:sldId id="269" r:id="rId14"/>
+    <p:sldId id="270" r:id="rId6"/>
+    <p:sldId id="271" r:id="rId7"/>
+    <p:sldId id="272" r:id="rId8"/>
+    <p:sldId id="260" r:id="rId9"/>
+    <p:sldId id="261" r:id="rId10"/>
+    <p:sldId id="262" r:id="rId11"/>
+    <p:sldId id="263" r:id="rId12"/>
+    <p:sldId id="264" r:id="rId13"/>
+    <p:sldId id="265" r:id="rId14"/>
+    <p:sldId id="266" r:id="rId15"/>
+    <p:sldId id="267" r:id="rId16"/>
+    <p:sldId id="269" r:id="rId17"/>
   </p:sldIdLst>
-  <p:sldSz cx="10080625" cy="7559675" type="screen4x3"/>
+  <p:sldSz cx="10080625" cy="7559675"/>
   <p:notesSz cx="7559675" cy="10691813"/>
   <p:defaultTextStyle>
     <a:defPPr>
@@ -1084,6 +1087,222 @@
 </p:notes>
 </file>
 
+<file path=ppt/notesSlides/notesSlide14.xml><?xml version="1.0" encoding="utf-8"?>
+<p:notes xmlns:a="http://schemas.openxmlformats.org/drawingml/2006/main" xmlns:r="http://schemas.openxmlformats.org/officeDocument/2006/relationships" xmlns:p="http://schemas.openxmlformats.org/presentationml/2006/main">
+  <p:cSld>
+    <p:spTree>
+      <p:nvGrpSpPr>
+        <p:cNvPr id="1" name=""/>
+        <p:cNvGrpSpPr/>
+        <p:nvPr/>
+      </p:nvGrpSpPr>
+      <p:grpSpPr>
+        <a:xfrm>
+          <a:off x="0" y="0"/>
+          <a:ext cx="0" cy="0"/>
+          <a:chOff x="0" y="0"/>
+          <a:chExt cx="0" cy="0"/>
+        </a:xfrm>
+      </p:grpSpPr>
+      <p:sp>
+        <p:nvSpPr>
+          <p:cNvPr id="2" name="Образ слайда 1"/>
+          <p:cNvSpPr>
+            <a:spLocks noGrp="1" noRot="1" noChangeAspect="1" noResize="1"/>
+          </p:cNvSpPr>
+          <p:nvPr>
+            <p:ph type="sldImg"/>
+          </p:nvPr>
+        </p:nvSpPr>
+        <p:spPr>
+          <a:xfrm>
+            <a:off x="1106488" y="812800"/>
+            <a:ext cx="5345112" cy="4008438"/>
+          </a:xfrm>
+          <a:solidFill>
+            <a:schemeClr val="accent1"/>
+          </a:solidFill>
+          <a:ln w="25400">
+            <a:solidFill>
+              <a:schemeClr val="accent1">
+                <a:shade val="50000"/>
+              </a:schemeClr>
+            </a:solidFill>
+            <a:prstDash val="solid"/>
+          </a:ln>
+        </p:spPr>
+      </p:sp>
+      <p:sp>
+        <p:nvSpPr>
+          <p:cNvPr id="3" name="Заметки 2"/>
+          <p:cNvSpPr txBox="1">
+            <a:spLocks noGrp="1"/>
+          </p:cNvSpPr>
+          <p:nvPr>
+            <p:ph type="body" sz="quarter" idx="1"/>
+          </p:nvPr>
+        </p:nvSpPr>
+        <p:spPr/>
+        <p:txBody>
+          <a:bodyPr/>
+          <a:lstStyle/>
+          <a:p>
+            <a:endParaRPr lang="de-DE"/>
+          </a:p>
+        </p:txBody>
+      </p:sp>
+    </p:spTree>
+  </p:cSld>
+  <p:clrMapOvr>
+    <a:masterClrMapping/>
+  </p:clrMapOvr>
+</p:notes>
+</file>
+
+<file path=ppt/notesSlides/notesSlide15.xml><?xml version="1.0" encoding="utf-8"?>
+<p:notes xmlns:a="http://schemas.openxmlformats.org/drawingml/2006/main" xmlns:r="http://schemas.openxmlformats.org/officeDocument/2006/relationships" xmlns:p="http://schemas.openxmlformats.org/presentationml/2006/main">
+  <p:cSld>
+    <p:spTree>
+      <p:nvGrpSpPr>
+        <p:cNvPr id="1" name=""/>
+        <p:cNvGrpSpPr/>
+        <p:nvPr/>
+      </p:nvGrpSpPr>
+      <p:grpSpPr>
+        <a:xfrm>
+          <a:off x="0" y="0"/>
+          <a:ext cx="0" cy="0"/>
+          <a:chOff x="0" y="0"/>
+          <a:chExt cx="0" cy="0"/>
+        </a:xfrm>
+      </p:grpSpPr>
+      <p:sp>
+        <p:nvSpPr>
+          <p:cNvPr id="2" name="Образ слайда 1"/>
+          <p:cNvSpPr>
+            <a:spLocks noGrp="1" noRot="1" noChangeAspect="1" noResize="1"/>
+          </p:cNvSpPr>
+          <p:nvPr>
+            <p:ph type="sldImg"/>
+          </p:nvPr>
+        </p:nvSpPr>
+        <p:spPr>
+          <a:xfrm>
+            <a:off x="1106488" y="812800"/>
+            <a:ext cx="5345112" cy="4008438"/>
+          </a:xfrm>
+          <a:solidFill>
+            <a:schemeClr val="accent1"/>
+          </a:solidFill>
+          <a:ln w="25400">
+            <a:solidFill>
+              <a:schemeClr val="accent1">
+                <a:shade val="50000"/>
+              </a:schemeClr>
+            </a:solidFill>
+            <a:prstDash val="solid"/>
+          </a:ln>
+        </p:spPr>
+      </p:sp>
+      <p:sp>
+        <p:nvSpPr>
+          <p:cNvPr id="3" name="Заметки 2"/>
+          <p:cNvSpPr txBox="1">
+            <a:spLocks noGrp="1"/>
+          </p:cNvSpPr>
+          <p:nvPr>
+            <p:ph type="body" sz="quarter" idx="1"/>
+          </p:nvPr>
+        </p:nvSpPr>
+        <p:spPr/>
+        <p:txBody>
+          <a:bodyPr/>
+          <a:lstStyle/>
+          <a:p>
+            <a:endParaRPr lang="de-DE"/>
+          </a:p>
+        </p:txBody>
+      </p:sp>
+    </p:spTree>
+  </p:cSld>
+  <p:clrMapOvr>
+    <a:masterClrMapping/>
+  </p:clrMapOvr>
+</p:notes>
+</file>
+
+<file path=ppt/notesSlides/notesSlide16.xml><?xml version="1.0" encoding="utf-8"?>
+<p:notes xmlns:a="http://schemas.openxmlformats.org/drawingml/2006/main" xmlns:r="http://schemas.openxmlformats.org/officeDocument/2006/relationships" xmlns:p="http://schemas.openxmlformats.org/presentationml/2006/main">
+  <p:cSld>
+    <p:spTree>
+      <p:nvGrpSpPr>
+        <p:cNvPr id="1" name=""/>
+        <p:cNvGrpSpPr/>
+        <p:nvPr/>
+      </p:nvGrpSpPr>
+      <p:grpSpPr>
+        <a:xfrm>
+          <a:off x="0" y="0"/>
+          <a:ext cx="0" cy="0"/>
+          <a:chOff x="0" y="0"/>
+          <a:chExt cx="0" cy="0"/>
+        </a:xfrm>
+      </p:grpSpPr>
+      <p:sp>
+        <p:nvSpPr>
+          <p:cNvPr id="2" name="Образ слайда 1"/>
+          <p:cNvSpPr>
+            <a:spLocks noGrp="1" noRot="1" noChangeAspect="1" noResize="1"/>
+          </p:cNvSpPr>
+          <p:nvPr>
+            <p:ph type="sldImg"/>
+          </p:nvPr>
+        </p:nvSpPr>
+        <p:spPr>
+          <a:xfrm>
+            <a:off x="1106488" y="812800"/>
+            <a:ext cx="5345112" cy="4008438"/>
+          </a:xfrm>
+          <a:solidFill>
+            <a:schemeClr val="accent1"/>
+          </a:solidFill>
+          <a:ln w="25400">
+            <a:solidFill>
+              <a:schemeClr val="accent1">
+                <a:shade val="50000"/>
+              </a:schemeClr>
+            </a:solidFill>
+            <a:prstDash val="solid"/>
+          </a:ln>
+        </p:spPr>
+      </p:sp>
+      <p:sp>
+        <p:nvSpPr>
+          <p:cNvPr id="3" name="Заметки 2"/>
+          <p:cNvSpPr txBox="1">
+            <a:spLocks noGrp="1"/>
+          </p:cNvSpPr>
+          <p:nvPr>
+            <p:ph type="body" sz="quarter" idx="1"/>
+          </p:nvPr>
+        </p:nvSpPr>
+        <p:spPr/>
+        <p:txBody>
+          <a:bodyPr/>
+          <a:lstStyle/>
+          <a:p>
+            <a:endParaRPr lang="de-DE"/>
+          </a:p>
+        </p:txBody>
+      </p:sp>
+    </p:spTree>
+  </p:cSld>
+  <p:clrMapOvr>
+    <a:masterClrMapping/>
+  </p:clrMapOvr>
+</p:notes>
+</file>
+
 <file path=ppt/notesSlides/notesSlide2.xml><?xml version="1.0" encoding="utf-8"?>
 <p:notes xmlns:a="http://schemas.openxmlformats.org/drawingml/2006/main" xmlns:r="http://schemas.openxmlformats.org/officeDocument/2006/relationships" xmlns:p="http://schemas.openxmlformats.org/presentationml/2006/main">
   <p:cSld>
@@ -1897,11 +2116,11 @@
   <p:clrMapOvr>
     <a:masterClrMapping/>
   </p:clrMapOvr>
-  <mc:AlternateContent xmlns:mc="http://schemas.openxmlformats.org/markup-compatibility/2006">
-    <mc:Choice xmlns:p14="http://schemas.microsoft.com/office/powerpoint/2010/main" Requires="p14">
+  <mc:AlternateContent xmlns:mc="http://schemas.openxmlformats.org/markup-compatibility/2006" xmlns:p14="http://schemas.microsoft.com/office/powerpoint/2010/main">
+    <mc:Choice Requires="p14">
       <p:transition spd="slow" p14:dur="2000"/>
     </mc:Choice>
-    <mc:Fallback>
+    <mc:Fallback xmlns="">
       <p:transition spd="slow"/>
     </mc:Fallback>
   </mc:AlternateContent>
@@ -2073,11 +2292,11 @@
   <p:clrMapOvr>
     <a:masterClrMapping/>
   </p:clrMapOvr>
-  <mc:AlternateContent xmlns:mc="http://schemas.openxmlformats.org/markup-compatibility/2006">
-    <mc:Choice xmlns:p14="http://schemas.microsoft.com/office/powerpoint/2010/main" Requires="p14">
+  <mc:AlternateContent xmlns:mc="http://schemas.openxmlformats.org/markup-compatibility/2006" xmlns:p14="http://schemas.microsoft.com/office/powerpoint/2010/main">
+    <mc:Choice Requires="p14">
       <p:transition spd="slow" p14:dur="2000"/>
     </mc:Choice>
-    <mc:Fallback>
+    <mc:Fallback xmlns="">
       <p:transition spd="slow"/>
     </mc:Fallback>
   </mc:AlternateContent>
@@ -2259,11 +2478,11 @@
   <p:clrMapOvr>
     <a:masterClrMapping/>
   </p:clrMapOvr>
-  <mc:AlternateContent xmlns:mc="http://schemas.openxmlformats.org/markup-compatibility/2006">
-    <mc:Choice xmlns:p14="http://schemas.microsoft.com/office/powerpoint/2010/main" Requires="p14">
+  <mc:AlternateContent xmlns:mc="http://schemas.openxmlformats.org/markup-compatibility/2006" xmlns:p14="http://schemas.microsoft.com/office/powerpoint/2010/main">
+    <mc:Choice Requires="p14">
       <p:transition spd="slow" p14:dur="2000"/>
     </mc:Choice>
-    <mc:Fallback>
+    <mc:Fallback xmlns="">
       <p:transition spd="slow"/>
     </mc:Fallback>
   </mc:AlternateContent>
@@ -2435,11 +2654,11 @@
   <p:clrMapOvr>
     <a:masterClrMapping/>
   </p:clrMapOvr>
-  <mc:AlternateContent xmlns:mc="http://schemas.openxmlformats.org/markup-compatibility/2006">
-    <mc:Choice xmlns:p14="http://schemas.microsoft.com/office/powerpoint/2010/main" Requires="p14">
+  <mc:AlternateContent xmlns:mc="http://schemas.openxmlformats.org/markup-compatibility/2006" xmlns:p14="http://schemas.microsoft.com/office/powerpoint/2010/main">
+    <mc:Choice Requires="p14">
       <p:transition spd="slow" p14:dur="2000"/>
     </mc:Choice>
-    <mc:Fallback>
+    <mc:Fallback xmlns="">
       <p:transition spd="slow"/>
     </mc:Fallback>
   </mc:AlternateContent>
@@ -2687,11 +2906,11 @@
   <p:clrMapOvr>
     <a:masterClrMapping/>
   </p:clrMapOvr>
-  <mc:AlternateContent xmlns:mc="http://schemas.openxmlformats.org/markup-compatibility/2006">
-    <mc:Choice xmlns:p14="http://schemas.microsoft.com/office/powerpoint/2010/main" Requires="p14">
+  <mc:AlternateContent xmlns:mc="http://schemas.openxmlformats.org/markup-compatibility/2006" xmlns:p14="http://schemas.microsoft.com/office/powerpoint/2010/main">
+    <mc:Choice Requires="p14">
       <p:transition spd="slow" p14:dur="2000"/>
     </mc:Choice>
-    <mc:Fallback>
+    <mc:Fallback xmlns="">
       <p:transition spd="slow"/>
     </mc:Fallback>
   </mc:AlternateContent>
@@ -2981,11 +3200,11 @@
   <p:clrMapOvr>
     <a:masterClrMapping/>
   </p:clrMapOvr>
-  <mc:AlternateContent xmlns:mc="http://schemas.openxmlformats.org/markup-compatibility/2006">
-    <mc:Choice xmlns:p14="http://schemas.microsoft.com/office/powerpoint/2010/main" Requires="p14">
+  <mc:AlternateContent xmlns:mc="http://schemas.openxmlformats.org/markup-compatibility/2006" xmlns:p14="http://schemas.microsoft.com/office/powerpoint/2010/main">
+    <mc:Choice Requires="p14">
       <p:transition spd="slow" p14:dur="2000"/>
     </mc:Choice>
-    <mc:Fallback>
+    <mc:Fallback xmlns="">
       <p:transition spd="slow"/>
     </mc:Fallback>
   </mc:AlternateContent>
@@ -3414,11 +3633,11 @@
   <p:clrMapOvr>
     <a:masterClrMapping/>
   </p:clrMapOvr>
-  <mc:AlternateContent xmlns:mc="http://schemas.openxmlformats.org/markup-compatibility/2006">
-    <mc:Choice xmlns:p14="http://schemas.microsoft.com/office/powerpoint/2010/main" Requires="p14">
+  <mc:AlternateContent xmlns:mc="http://schemas.openxmlformats.org/markup-compatibility/2006" xmlns:p14="http://schemas.microsoft.com/office/powerpoint/2010/main">
+    <mc:Choice Requires="p14">
       <p:transition spd="slow" p14:dur="2000"/>
     </mc:Choice>
-    <mc:Fallback>
+    <mc:Fallback xmlns="">
       <p:transition spd="slow"/>
     </mc:Fallback>
   </mc:AlternateContent>
@@ -3538,11 +3757,11 @@
   <p:clrMapOvr>
     <a:masterClrMapping/>
   </p:clrMapOvr>
-  <mc:AlternateContent xmlns:mc="http://schemas.openxmlformats.org/markup-compatibility/2006">
-    <mc:Choice xmlns:p14="http://schemas.microsoft.com/office/powerpoint/2010/main" Requires="p14">
+  <mc:AlternateContent xmlns:mc="http://schemas.openxmlformats.org/markup-compatibility/2006" xmlns:p14="http://schemas.microsoft.com/office/powerpoint/2010/main">
+    <mc:Choice Requires="p14">
       <p:transition spd="slow" p14:dur="2000"/>
     </mc:Choice>
-    <mc:Fallback>
+    <mc:Fallback xmlns="">
       <p:transition spd="slow"/>
     </mc:Fallback>
   </mc:AlternateContent>
@@ -3639,11 +3858,11 @@
   <p:clrMapOvr>
     <a:masterClrMapping/>
   </p:clrMapOvr>
-  <mc:AlternateContent xmlns:mc="http://schemas.openxmlformats.org/markup-compatibility/2006">
-    <mc:Choice xmlns:p14="http://schemas.microsoft.com/office/powerpoint/2010/main" Requires="p14">
+  <mc:AlternateContent xmlns:mc="http://schemas.openxmlformats.org/markup-compatibility/2006" xmlns:p14="http://schemas.microsoft.com/office/powerpoint/2010/main">
+    <mc:Choice Requires="p14">
       <p:transition spd="slow" p14:dur="2000"/>
     </mc:Choice>
-    <mc:Fallback>
+    <mc:Fallback xmlns="">
       <p:transition spd="slow"/>
     </mc:Fallback>
   </mc:AlternateContent>
@@ -3923,11 +4142,11 @@
   <p:clrMapOvr>
     <a:masterClrMapping/>
   </p:clrMapOvr>
-  <mc:AlternateContent xmlns:mc="http://schemas.openxmlformats.org/markup-compatibility/2006">
-    <mc:Choice xmlns:p14="http://schemas.microsoft.com/office/powerpoint/2010/main" Requires="p14">
+  <mc:AlternateContent xmlns:mc="http://schemas.openxmlformats.org/markup-compatibility/2006" xmlns:p14="http://schemas.microsoft.com/office/powerpoint/2010/main">
+    <mc:Choice Requires="p14">
       <p:transition spd="slow" p14:dur="2000"/>
     </mc:Choice>
-    <mc:Fallback>
+    <mc:Fallback xmlns="">
       <p:transition spd="slow"/>
     </mc:Fallback>
   </mc:AlternateContent>
@@ -4182,11 +4401,11 @@
   <p:clrMapOvr>
     <a:masterClrMapping/>
   </p:clrMapOvr>
-  <mc:AlternateContent xmlns:mc="http://schemas.openxmlformats.org/markup-compatibility/2006">
-    <mc:Choice xmlns:p14="http://schemas.microsoft.com/office/powerpoint/2010/main" Requires="p14">
+  <mc:AlternateContent xmlns:mc="http://schemas.openxmlformats.org/markup-compatibility/2006" xmlns:p14="http://schemas.microsoft.com/office/powerpoint/2010/main">
+    <mc:Choice Requires="p14">
       <p:transition spd="slow" p14:dur="2000"/>
     </mc:Choice>
-    <mc:Fallback>
+    <mc:Fallback xmlns="">
       <p:transition spd="slow"/>
     </mc:Fallback>
   </mc:AlternateContent>
@@ -4698,11 +4917,11 @@
     <p:sldLayoutId id="2147483658" r:id="rId10"/>
     <p:sldLayoutId id="2147483659" r:id="rId11"/>
   </p:sldLayoutIdLst>
-  <mc:AlternateContent xmlns:mc="http://schemas.openxmlformats.org/markup-compatibility/2006">
-    <mc:Choice xmlns:p14="http://schemas.microsoft.com/office/powerpoint/2010/main" Requires="p14">
+  <mc:AlternateContent xmlns:mc="http://schemas.openxmlformats.org/markup-compatibility/2006" xmlns:p14="http://schemas.microsoft.com/office/powerpoint/2010/main">
+    <mc:Choice Requires="p14">
       <p:transition spd="slow" p14:dur="2000"/>
     </mc:Choice>
-    <mc:Fallback>
+    <mc:Fallback xmlns="">
       <p:transition spd="slow"/>
     </mc:Fallback>
   </mc:AlternateContent>
@@ -5055,11 +5274,11 @@
   <p:clrMapOvr>
     <a:masterClrMapping/>
   </p:clrMapOvr>
-  <mc:AlternateContent xmlns:mc="http://schemas.openxmlformats.org/markup-compatibility/2006">
-    <mc:Choice xmlns:p14="http://schemas.microsoft.com/office/powerpoint/2010/main" Requires="p14">
+  <mc:AlternateContent xmlns:mc="http://schemas.openxmlformats.org/markup-compatibility/2006" xmlns:p14="http://schemas.microsoft.com/office/powerpoint/2010/main">
+    <mc:Choice Requires="p14">
       <p:transition spd="slow" p14:dur="2000"/>
     </mc:Choice>
-    <mc:Fallback>
+    <mc:Fallback xmlns="">
       <p:transition spd="slow"/>
     </mc:Fallback>
   </mc:AlternateContent>
@@ -5074,6 +5293,999 @@
 </file>
 
 <file path=ppt/slides/slide10.xml><?xml version="1.0" encoding="utf-8"?>
+<p:sld xmlns:a="http://schemas.openxmlformats.org/drawingml/2006/main" xmlns:r="http://schemas.openxmlformats.org/officeDocument/2006/relationships" xmlns:p="http://schemas.openxmlformats.org/presentationml/2006/main" show="0">
+  <p:cSld name="page7">
+    <p:spTree>
+      <p:nvGrpSpPr>
+        <p:cNvPr id="1" name=""/>
+        <p:cNvGrpSpPr/>
+        <p:nvPr/>
+      </p:nvGrpSpPr>
+      <p:grpSpPr>
+        <a:xfrm>
+          <a:off x="0" y="0"/>
+          <a:ext cx="0" cy="0"/>
+          <a:chOff x="0" y="0"/>
+          <a:chExt cx="0" cy="0"/>
+        </a:xfrm>
+      </p:grpSpPr>
+      <p:sp>
+        <p:nvSpPr>
+          <p:cNvPr id="6" name="Прямоугольник 5"/>
+          <p:cNvSpPr/>
+          <p:nvPr/>
+        </p:nvSpPr>
+        <p:spPr>
+          <a:xfrm>
+            <a:off x="-9053" y="323453"/>
+            <a:ext cx="10104505" cy="1224136"/>
+          </a:xfrm>
+          <a:prstGeom prst="rect">
+            <a:avLst/>
+          </a:prstGeom>
+          <a:solidFill>
+            <a:schemeClr val="accent2"/>
+          </a:solidFill>
+          <a:ln>
+            <a:noFill/>
+          </a:ln>
+        </p:spPr>
+        <p:style>
+          <a:lnRef idx="2">
+            <a:schemeClr val="accent2">
+              <a:shade val="50000"/>
+            </a:schemeClr>
+          </a:lnRef>
+          <a:fillRef idx="1">
+            <a:schemeClr val="accent2"/>
+          </a:fillRef>
+          <a:effectRef idx="0">
+            <a:schemeClr val="accent2"/>
+          </a:effectRef>
+          <a:fontRef idx="minor">
+            <a:schemeClr val="lt1"/>
+          </a:fontRef>
+        </p:style>
+        <p:txBody>
+          <a:bodyPr rtlCol="0" anchor="ctr"/>
+          <a:lstStyle/>
+          <a:p>
+            <a:pPr algn="ctr"/>
+            <a:endParaRPr lang="ru-RU"/>
+          </a:p>
+        </p:txBody>
+      </p:sp>
+      <p:sp>
+        <p:nvSpPr>
+          <p:cNvPr id="2" name="Заголовок 1"/>
+          <p:cNvSpPr txBox="1">
+            <a:spLocks noGrp="1"/>
+          </p:cNvSpPr>
+          <p:nvPr>
+            <p:ph type="title" idx="4294967295"/>
+          </p:nvPr>
+        </p:nvSpPr>
+        <p:spPr/>
+        <p:txBody>
+          <a:bodyPr/>
+          <a:lstStyle>
+            <a:defPPr lvl="0">
+              <a:buSzPct val="45000"/>
+              <a:buFont typeface="StarSymbol"/>
+              <a:buNone/>
+            </a:defPPr>
+            <a:lvl1pPr lvl="0">
+              <a:buSzPct val="45000"/>
+              <a:buFont typeface="StarSymbol"/>
+              <a:buChar char="●"/>
+            </a:lvl1pPr>
+            <a:lvl2pPr lvl="1">
+              <a:buSzPct val="45000"/>
+              <a:buFont typeface="StarSymbol"/>
+              <a:buChar char="●"/>
+            </a:lvl2pPr>
+            <a:lvl3pPr lvl="2">
+              <a:buSzPct val="45000"/>
+              <a:buFont typeface="StarSymbol"/>
+              <a:buChar char="●"/>
+            </a:lvl3pPr>
+            <a:lvl4pPr lvl="3">
+              <a:buSzPct val="45000"/>
+              <a:buFont typeface="StarSymbol"/>
+              <a:buChar char="●"/>
+            </a:lvl4pPr>
+            <a:lvl5pPr lvl="4">
+              <a:buSzPct val="45000"/>
+              <a:buFont typeface="StarSymbol"/>
+              <a:buChar char="●"/>
+            </a:lvl5pPr>
+            <a:lvl6pPr lvl="5">
+              <a:buSzPct val="45000"/>
+              <a:buFont typeface="StarSymbol"/>
+              <a:buChar char="●"/>
+            </a:lvl6pPr>
+            <a:lvl7pPr lvl="6">
+              <a:buSzPct val="45000"/>
+              <a:buFont typeface="StarSymbol"/>
+              <a:buChar char="●"/>
+            </a:lvl7pPr>
+            <a:lvl8pPr lvl="7">
+              <a:buSzPct val="45000"/>
+              <a:buFont typeface="StarSymbol"/>
+              <a:buChar char="●"/>
+            </a:lvl8pPr>
+            <a:lvl9pPr lvl="8">
+              <a:buSzPct val="45000"/>
+              <a:buFont typeface="StarSymbol"/>
+              <a:buChar char="●"/>
+            </a:lvl9pPr>
+          </a:lstStyle>
+          <a:p>
+            <a:pPr lvl="0">
+              <a:buNone/>
+            </a:pPr>
+            <a:r>
+              <a:rPr lang="de-DE" b="1" dirty="0"/>
+              <a:t>Entity relationship modell</a:t>
+            </a:r>
+          </a:p>
+        </p:txBody>
+      </p:sp>
+      <p:pic>
+        <p:nvPicPr>
+          <p:cNvPr id="3" name="Рисунок 2"/>
+          <p:cNvPicPr>
+            <a:picLocks noGrp="1" noChangeAspect="1"/>
+          </p:cNvPicPr>
+          <p:nvPr>
+            <p:ph type="pic" idx="4294967295"/>
+          </p:nvPr>
+        </p:nvPicPr>
+        <p:blipFill>
+          <a:blip r:embed="rId3">
+            <a:lum/>
+            <a:alphaModFix/>
+          </a:blip>
+          <a:srcRect/>
+          <a:stretch>
+            <a:fillRect/>
+          </a:stretch>
+        </p:blipFill>
+        <p:spPr>
+          <a:xfrm>
+            <a:off x="503640" y="2232509"/>
+            <a:ext cx="9071640" cy="4355640"/>
+          </a:xfrm>
+        </p:spPr>
+      </p:pic>
+    </p:spTree>
+  </p:cSld>
+  <p:clrMapOvr>
+    <a:masterClrMapping/>
+  </p:clrMapOvr>
+  <mc:AlternateContent xmlns:mc="http://schemas.openxmlformats.org/markup-compatibility/2006" xmlns:p14="http://schemas.microsoft.com/office/powerpoint/2010/main">
+    <mc:Choice Requires="p14">
+      <p:transition spd="slow" p14:dur="2000"/>
+    </mc:Choice>
+    <mc:Fallback xmlns="">
+      <p:transition spd="slow"/>
+    </mc:Fallback>
+  </mc:AlternateContent>
+  <p:timing>
+    <p:tnLst>
+      <p:par>
+        <p:cTn id="1" dur="indefinite" restart="never" nodeType="tmRoot"/>
+      </p:par>
+    </p:tnLst>
+  </p:timing>
+</p:sld>
+</file>
+
+<file path=ppt/slides/slide11.xml><?xml version="1.0" encoding="utf-8"?>
+<p:sld xmlns:a="http://schemas.openxmlformats.org/drawingml/2006/main" xmlns:r="http://schemas.openxmlformats.org/officeDocument/2006/relationships" xmlns:p="http://schemas.openxmlformats.org/presentationml/2006/main">
+  <p:cSld name="page8">
+    <p:spTree>
+      <p:nvGrpSpPr>
+        <p:cNvPr id="1" name=""/>
+        <p:cNvGrpSpPr/>
+        <p:nvPr/>
+      </p:nvGrpSpPr>
+      <p:grpSpPr>
+        <a:xfrm>
+          <a:off x="0" y="0"/>
+          <a:ext cx="0" cy="0"/>
+          <a:chOff x="0" y="0"/>
+          <a:chExt cx="0" cy="0"/>
+        </a:xfrm>
+      </p:grpSpPr>
+      <p:sp>
+        <p:nvSpPr>
+          <p:cNvPr id="6" name="Прямоугольник 5"/>
+          <p:cNvSpPr/>
+          <p:nvPr/>
+        </p:nvSpPr>
+        <p:spPr>
+          <a:xfrm>
+            <a:off x="-9053" y="323453"/>
+            <a:ext cx="10104505" cy="1224136"/>
+          </a:xfrm>
+          <a:prstGeom prst="rect">
+            <a:avLst/>
+          </a:prstGeom>
+          <a:solidFill>
+            <a:schemeClr val="accent2"/>
+          </a:solidFill>
+          <a:ln>
+            <a:noFill/>
+          </a:ln>
+        </p:spPr>
+        <p:style>
+          <a:lnRef idx="2">
+            <a:schemeClr val="accent2">
+              <a:shade val="50000"/>
+            </a:schemeClr>
+          </a:lnRef>
+          <a:fillRef idx="1">
+            <a:schemeClr val="accent2"/>
+          </a:fillRef>
+          <a:effectRef idx="0">
+            <a:schemeClr val="accent2"/>
+          </a:effectRef>
+          <a:fontRef idx="minor">
+            <a:schemeClr val="lt1"/>
+          </a:fontRef>
+        </p:style>
+        <p:txBody>
+          <a:bodyPr rtlCol="0" anchor="ctr"/>
+          <a:lstStyle/>
+          <a:p>
+            <a:pPr algn="ctr"/>
+            <a:endParaRPr lang="ru-RU"/>
+          </a:p>
+        </p:txBody>
+      </p:sp>
+      <p:sp>
+        <p:nvSpPr>
+          <p:cNvPr id="2" name="Заголовок 1"/>
+          <p:cNvSpPr txBox="1">
+            <a:spLocks noGrp="1"/>
+          </p:cNvSpPr>
+          <p:nvPr>
+            <p:ph type="title" idx="4294967295"/>
+          </p:nvPr>
+        </p:nvSpPr>
+        <p:spPr/>
+        <p:txBody>
+          <a:bodyPr/>
+          <a:lstStyle>
+            <a:defPPr lvl="0">
+              <a:buSzPct val="45000"/>
+              <a:buFont typeface="StarSymbol"/>
+              <a:buNone/>
+            </a:defPPr>
+            <a:lvl1pPr lvl="0">
+              <a:buSzPct val="45000"/>
+              <a:buFont typeface="StarSymbol"/>
+              <a:buChar char="●"/>
+            </a:lvl1pPr>
+            <a:lvl2pPr lvl="1">
+              <a:buSzPct val="45000"/>
+              <a:buFont typeface="StarSymbol"/>
+              <a:buChar char="●"/>
+            </a:lvl2pPr>
+            <a:lvl3pPr lvl="2">
+              <a:buSzPct val="45000"/>
+              <a:buFont typeface="StarSymbol"/>
+              <a:buChar char="●"/>
+            </a:lvl3pPr>
+            <a:lvl4pPr lvl="3">
+              <a:buSzPct val="45000"/>
+              <a:buFont typeface="StarSymbol"/>
+              <a:buChar char="●"/>
+            </a:lvl4pPr>
+            <a:lvl5pPr lvl="4">
+              <a:buSzPct val="45000"/>
+              <a:buFont typeface="StarSymbol"/>
+              <a:buChar char="●"/>
+            </a:lvl5pPr>
+            <a:lvl6pPr lvl="5">
+              <a:buSzPct val="45000"/>
+              <a:buFont typeface="StarSymbol"/>
+              <a:buChar char="●"/>
+            </a:lvl6pPr>
+            <a:lvl7pPr lvl="6">
+              <a:buSzPct val="45000"/>
+              <a:buFont typeface="StarSymbol"/>
+              <a:buChar char="●"/>
+            </a:lvl7pPr>
+            <a:lvl8pPr lvl="7">
+              <a:buSzPct val="45000"/>
+              <a:buFont typeface="StarSymbol"/>
+              <a:buChar char="●"/>
+            </a:lvl8pPr>
+            <a:lvl9pPr lvl="8">
+              <a:buSzPct val="45000"/>
+              <a:buFont typeface="StarSymbol"/>
+              <a:buChar char="●"/>
+            </a:lvl9pPr>
+          </a:lstStyle>
+          <a:p>
+            <a:pPr lvl="0">
+              <a:buNone/>
+            </a:pPr>
+            <a:r>
+              <a:rPr lang="de-DE" b="1" dirty="0"/>
+              <a:t>Umsetzung</a:t>
+            </a:r>
+          </a:p>
+        </p:txBody>
+      </p:sp>
+      <p:sp>
+        <p:nvSpPr>
+          <p:cNvPr id="3" name="Текст 2"/>
+          <p:cNvSpPr txBox="1">
+            <a:spLocks noGrp="1"/>
+          </p:cNvSpPr>
+          <p:nvPr>
+            <p:ph type="body" idx="4294967295"/>
+          </p:nvPr>
+        </p:nvSpPr>
+        <p:spPr>
+          <a:xfrm>
+            <a:off x="503999" y="2246981"/>
+            <a:ext cx="9071640" cy="4989240"/>
+          </a:xfrm>
+        </p:spPr>
+        <p:txBody>
+          <a:bodyPr/>
+          <a:lstStyle>
+            <a:defPPr marL="432000" marR="0" lvl="0" indent="-324000">
+              <a:spcBef>
+                <a:spcPts val="0"/>
+              </a:spcBef>
+              <a:spcAft>
+                <a:spcPts val="1414"/>
+              </a:spcAft>
+              <a:buSzPct val="45000"/>
+              <a:buFont typeface="StarSymbol"/>
+              <a:buNone/>
+              <a:defRPr lang="de-DE" sz="3200" b="0" i="0" u="none" strike="noStrike" kern="1200">
+                <a:ln>
+                  <a:noFill/>
+                </a:ln>
+                <a:latin typeface="Arial" pitchFamily="18"/>
+                <a:ea typeface="Microsoft YaHei" pitchFamily="2"/>
+                <a:cs typeface="Lucida Sans" pitchFamily="2"/>
+              </a:defRPr>
+            </a:defPPr>
+            <a:lvl1pPr marL="432000" marR="0" lvl="0" indent="-324000">
+              <a:spcBef>
+                <a:spcPts val="0"/>
+              </a:spcBef>
+              <a:spcAft>
+                <a:spcPts val="1414"/>
+              </a:spcAft>
+              <a:buSzPct val="45000"/>
+              <a:buFont typeface="StarSymbol"/>
+              <a:buChar char="●"/>
+              <a:defRPr lang="de-DE" sz="3200" b="0" i="0" u="none" strike="noStrike" kern="1200">
+                <a:ln>
+                  <a:noFill/>
+                </a:ln>
+                <a:latin typeface="Arial" pitchFamily="18"/>
+                <a:ea typeface="Microsoft YaHei" pitchFamily="2"/>
+                <a:cs typeface="Lucida Sans" pitchFamily="2"/>
+              </a:defRPr>
+            </a:lvl1pPr>
+            <a:lvl2pPr marL="864000" marR="0" lvl="1" indent="-324000">
+              <a:spcBef>
+                <a:spcPts val="0"/>
+              </a:spcBef>
+              <a:spcAft>
+                <a:spcPts val="1134"/>
+              </a:spcAft>
+              <a:buSzPct val="75000"/>
+              <a:buFont typeface="StarSymbol"/>
+              <a:buChar char="–"/>
+              <a:defRPr lang="de-DE" sz="2800" b="0" i="0" u="none" strike="noStrike" kern="1200">
+                <a:ln>
+                  <a:noFill/>
+                </a:ln>
+                <a:latin typeface="Arial" pitchFamily="18"/>
+                <a:ea typeface="Microsoft YaHei" pitchFamily="2"/>
+                <a:cs typeface="Lucida Sans" pitchFamily="2"/>
+              </a:defRPr>
+            </a:lvl2pPr>
+            <a:lvl3pPr marL="1295999" marR="0" lvl="2" indent="-288000">
+              <a:spcBef>
+                <a:spcPts val="0"/>
+              </a:spcBef>
+              <a:spcAft>
+                <a:spcPts val="850"/>
+              </a:spcAft>
+              <a:buSzPct val="45000"/>
+              <a:buFont typeface="StarSymbol"/>
+              <a:buChar char="●"/>
+              <a:defRPr lang="de-DE" sz="2400" b="0" i="0" u="none" strike="noStrike" kern="1200">
+                <a:ln>
+                  <a:noFill/>
+                </a:ln>
+                <a:latin typeface="Arial" pitchFamily="18"/>
+                <a:ea typeface="Microsoft YaHei" pitchFamily="2"/>
+                <a:cs typeface="Lucida Sans" pitchFamily="2"/>
+              </a:defRPr>
+            </a:lvl3pPr>
+            <a:lvl4pPr marL="1728000" marR="0" lvl="3" indent="-216000">
+              <a:spcBef>
+                <a:spcPts val="0"/>
+              </a:spcBef>
+              <a:spcAft>
+                <a:spcPts val="567"/>
+              </a:spcAft>
+              <a:buSzPct val="75000"/>
+              <a:buFont typeface="StarSymbol"/>
+              <a:buChar char="–"/>
+              <a:defRPr lang="de-DE" sz="2000" b="0" i="0" u="none" strike="noStrike" kern="1200">
+                <a:ln>
+                  <a:noFill/>
+                </a:ln>
+                <a:latin typeface="Arial" pitchFamily="18"/>
+                <a:ea typeface="Microsoft YaHei" pitchFamily="2"/>
+                <a:cs typeface="Lucida Sans" pitchFamily="2"/>
+              </a:defRPr>
+            </a:lvl4pPr>
+            <a:lvl5pPr marL="2160000" marR="0" lvl="4" indent="-216000">
+              <a:spcBef>
+                <a:spcPts val="0"/>
+              </a:spcBef>
+              <a:spcAft>
+                <a:spcPts val="283"/>
+              </a:spcAft>
+              <a:buSzPct val="45000"/>
+              <a:buFont typeface="StarSymbol"/>
+              <a:buChar char="●"/>
+              <a:defRPr lang="de-DE" sz="2000" b="0" i="0" u="none" strike="noStrike" kern="1200">
+                <a:ln>
+                  <a:noFill/>
+                </a:ln>
+                <a:latin typeface="Arial" pitchFamily="18"/>
+                <a:ea typeface="Microsoft YaHei" pitchFamily="2"/>
+                <a:cs typeface="Lucida Sans" pitchFamily="2"/>
+              </a:defRPr>
+            </a:lvl5pPr>
+            <a:lvl6pPr marL="2592000" marR="0" lvl="5" indent="-216000">
+              <a:spcBef>
+                <a:spcPts val="0"/>
+              </a:spcBef>
+              <a:spcAft>
+                <a:spcPts val="283"/>
+              </a:spcAft>
+              <a:buSzPct val="45000"/>
+              <a:buFont typeface="StarSymbol"/>
+              <a:buChar char="●"/>
+              <a:defRPr lang="de-DE" sz="2000" b="0" i="0" u="none" strike="noStrike" kern="1200">
+                <a:ln>
+                  <a:noFill/>
+                </a:ln>
+                <a:latin typeface="Arial" pitchFamily="18"/>
+                <a:ea typeface="Microsoft YaHei" pitchFamily="2"/>
+                <a:cs typeface="Lucida Sans" pitchFamily="2"/>
+              </a:defRPr>
+            </a:lvl6pPr>
+            <a:lvl7pPr marL="3024000" marR="0" lvl="6" indent="-216000">
+              <a:spcBef>
+                <a:spcPts val="0"/>
+              </a:spcBef>
+              <a:spcAft>
+                <a:spcPts val="283"/>
+              </a:spcAft>
+              <a:buSzPct val="45000"/>
+              <a:buFont typeface="StarSymbol"/>
+              <a:buChar char="●"/>
+              <a:defRPr lang="de-DE" sz="2000" b="0" i="0" u="none" strike="noStrike" kern="1200">
+                <a:ln>
+                  <a:noFill/>
+                </a:ln>
+                <a:latin typeface="Arial" pitchFamily="18"/>
+                <a:ea typeface="Microsoft YaHei" pitchFamily="2"/>
+                <a:cs typeface="Lucida Sans" pitchFamily="2"/>
+              </a:defRPr>
+            </a:lvl7pPr>
+            <a:lvl8pPr marL="3456000" marR="0" lvl="7" indent="-216000">
+              <a:spcBef>
+                <a:spcPts val="0"/>
+              </a:spcBef>
+              <a:spcAft>
+                <a:spcPts val="283"/>
+              </a:spcAft>
+              <a:buSzPct val="45000"/>
+              <a:buFont typeface="StarSymbol"/>
+              <a:buChar char="●"/>
+              <a:defRPr lang="de-DE" sz="2000" b="0" i="0" u="none" strike="noStrike" kern="1200">
+                <a:ln>
+                  <a:noFill/>
+                </a:ln>
+                <a:latin typeface="Arial" pitchFamily="18"/>
+                <a:ea typeface="Microsoft YaHei" pitchFamily="2"/>
+                <a:cs typeface="Lucida Sans" pitchFamily="2"/>
+              </a:defRPr>
+            </a:lvl8pPr>
+            <a:lvl9pPr marL="3887999" marR="0" lvl="8" indent="-216000">
+              <a:spcBef>
+                <a:spcPts val="0"/>
+              </a:spcBef>
+              <a:spcAft>
+                <a:spcPts val="283"/>
+              </a:spcAft>
+              <a:buSzPct val="45000"/>
+              <a:buFont typeface="StarSymbol"/>
+              <a:buChar char="●"/>
+              <a:defRPr lang="de-DE" sz="2000" b="0" i="0" u="none" strike="noStrike" kern="1200">
+                <a:ln>
+                  <a:noFill/>
+                </a:ln>
+                <a:latin typeface="Arial" pitchFamily="18"/>
+                <a:ea typeface="Microsoft YaHei" pitchFamily="2"/>
+                <a:cs typeface="Lucida Sans" pitchFamily="2"/>
+              </a:defRPr>
+            </a:lvl9pPr>
+          </a:lstStyle>
+          <a:p>
+            <a:pPr lvl="0"/>
+            <a:r>
+              <a:rPr lang="de-DE" dirty="0"/>
+              <a:t>Konzept erarbeitet</a:t>
+            </a:r>
+          </a:p>
+          <a:p>
+            <a:pPr lvl="0"/>
+            <a:r>
+              <a:rPr lang="de-DE" dirty="0"/>
+              <a:t>Grobes USE Case Diagramm erstellt</a:t>
+            </a:r>
+          </a:p>
+          <a:p>
+            <a:pPr lvl="0"/>
+            <a:r>
+              <a:rPr lang="de-DE" dirty="0"/>
+              <a:t>Oberfläche erstellt</a:t>
+            </a:r>
+          </a:p>
+          <a:p>
+            <a:pPr lvl="0"/>
+            <a:r>
+              <a:rPr lang="de-DE" dirty="0"/>
+              <a:t>Datenbank angelegt</a:t>
+            </a:r>
+          </a:p>
+          <a:p>
+            <a:pPr lvl="0"/>
+            <a:r>
+              <a:rPr lang="de-DE" dirty="0"/>
+              <a:t>Fehlerbehebung</a:t>
+            </a:r>
+          </a:p>
+        </p:txBody>
+      </p:sp>
+    </p:spTree>
+  </p:cSld>
+  <p:clrMapOvr>
+    <a:masterClrMapping/>
+  </p:clrMapOvr>
+  <mc:AlternateContent xmlns:mc="http://schemas.openxmlformats.org/markup-compatibility/2006" xmlns:p14="http://schemas.microsoft.com/office/powerpoint/2010/main">
+    <mc:Choice Requires="p14">
+      <p:transition spd="slow" p14:dur="2000"/>
+    </mc:Choice>
+    <mc:Fallback xmlns="">
+      <p:transition spd="slow"/>
+    </mc:Fallback>
+  </mc:AlternateContent>
+  <p:timing>
+    <p:tnLst>
+      <p:par>
+        <p:cTn id="1" dur="indefinite" restart="never" nodeType="tmRoot"/>
+      </p:par>
+    </p:tnLst>
+  </p:timing>
+</p:sld>
+</file>
+
+<file path=ppt/slides/slide12.xml><?xml version="1.0" encoding="utf-8"?>
+<p:sld xmlns:a="http://schemas.openxmlformats.org/drawingml/2006/main" xmlns:r="http://schemas.openxmlformats.org/officeDocument/2006/relationships" xmlns:p="http://schemas.openxmlformats.org/presentationml/2006/main">
+  <p:cSld name="page9">
+    <p:spTree>
+      <p:nvGrpSpPr>
+        <p:cNvPr id="1" name=""/>
+        <p:cNvGrpSpPr/>
+        <p:nvPr/>
+      </p:nvGrpSpPr>
+      <p:grpSpPr>
+        <a:xfrm>
+          <a:off x="0" y="0"/>
+          <a:ext cx="0" cy="0"/>
+          <a:chOff x="0" y="0"/>
+          <a:chExt cx="0" cy="0"/>
+        </a:xfrm>
+      </p:grpSpPr>
+      <p:sp>
+        <p:nvSpPr>
+          <p:cNvPr id="6" name="Прямоугольник 5"/>
+          <p:cNvSpPr/>
+          <p:nvPr/>
+        </p:nvSpPr>
+        <p:spPr>
+          <a:xfrm>
+            <a:off x="-9053" y="323453"/>
+            <a:ext cx="10104505" cy="1224136"/>
+          </a:xfrm>
+          <a:prstGeom prst="rect">
+            <a:avLst/>
+          </a:prstGeom>
+          <a:solidFill>
+            <a:schemeClr val="accent2"/>
+          </a:solidFill>
+          <a:ln>
+            <a:noFill/>
+          </a:ln>
+        </p:spPr>
+        <p:style>
+          <a:lnRef idx="2">
+            <a:schemeClr val="accent2">
+              <a:shade val="50000"/>
+            </a:schemeClr>
+          </a:lnRef>
+          <a:fillRef idx="1">
+            <a:schemeClr val="accent2"/>
+          </a:fillRef>
+          <a:effectRef idx="0">
+            <a:schemeClr val="accent2"/>
+          </a:effectRef>
+          <a:fontRef idx="minor">
+            <a:schemeClr val="lt1"/>
+          </a:fontRef>
+        </p:style>
+        <p:txBody>
+          <a:bodyPr rtlCol="0" anchor="ctr"/>
+          <a:lstStyle/>
+          <a:p>
+            <a:pPr algn="ctr"/>
+            <a:endParaRPr lang="ru-RU"/>
+          </a:p>
+        </p:txBody>
+      </p:sp>
+      <p:sp>
+        <p:nvSpPr>
+          <p:cNvPr id="2" name="Заголовок 1"/>
+          <p:cNvSpPr txBox="1">
+            <a:spLocks noGrp="1"/>
+          </p:cNvSpPr>
+          <p:nvPr>
+            <p:ph type="title" idx="4294967295"/>
+          </p:nvPr>
+        </p:nvSpPr>
+        <p:spPr/>
+        <p:txBody>
+          <a:bodyPr/>
+          <a:lstStyle>
+            <a:defPPr lvl="0">
+              <a:buSzPct val="45000"/>
+              <a:buFont typeface="StarSymbol"/>
+              <a:buNone/>
+            </a:defPPr>
+            <a:lvl1pPr lvl="0">
+              <a:buSzPct val="45000"/>
+              <a:buFont typeface="StarSymbol"/>
+              <a:buChar char="●"/>
+            </a:lvl1pPr>
+            <a:lvl2pPr lvl="1">
+              <a:buSzPct val="45000"/>
+              <a:buFont typeface="StarSymbol"/>
+              <a:buChar char="●"/>
+            </a:lvl2pPr>
+            <a:lvl3pPr lvl="2">
+              <a:buSzPct val="45000"/>
+              <a:buFont typeface="StarSymbol"/>
+              <a:buChar char="●"/>
+            </a:lvl3pPr>
+            <a:lvl4pPr lvl="3">
+              <a:buSzPct val="45000"/>
+              <a:buFont typeface="StarSymbol"/>
+              <a:buChar char="●"/>
+            </a:lvl4pPr>
+            <a:lvl5pPr lvl="4">
+              <a:buSzPct val="45000"/>
+              <a:buFont typeface="StarSymbol"/>
+              <a:buChar char="●"/>
+            </a:lvl5pPr>
+            <a:lvl6pPr lvl="5">
+              <a:buSzPct val="45000"/>
+              <a:buFont typeface="StarSymbol"/>
+              <a:buChar char="●"/>
+            </a:lvl6pPr>
+            <a:lvl7pPr lvl="6">
+              <a:buSzPct val="45000"/>
+              <a:buFont typeface="StarSymbol"/>
+              <a:buChar char="●"/>
+            </a:lvl7pPr>
+            <a:lvl8pPr lvl="7">
+              <a:buSzPct val="45000"/>
+              <a:buFont typeface="StarSymbol"/>
+              <a:buChar char="●"/>
+            </a:lvl8pPr>
+            <a:lvl9pPr lvl="8">
+              <a:buSzPct val="45000"/>
+              <a:buFont typeface="StarSymbol"/>
+              <a:buChar char="●"/>
+            </a:lvl9pPr>
+          </a:lstStyle>
+          <a:p>
+            <a:pPr lvl="0">
+              <a:buNone/>
+            </a:pPr>
+            <a:r>
+              <a:rPr lang="de-DE" b="1" dirty="0"/>
+              <a:t>Problematiken</a:t>
+            </a:r>
+          </a:p>
+        </p:txBody>
+      </p:sp>
+      <p:sp>
+        <p:nvSpPr>
+          <p:cNvPr id="3" name="Текст 2"/>
+          <p:cNvSpPr txBox="1">
+            <a:spLocks noGrp="1"/>
+          </p:cNvSpPr>
+          <p:nvPr>
+            <p:ph type="body" idx="4294967295"/>
+          </p:nvPr>
+        </p:nvSpPr>
+        <p:spPr>
+          <a:xfrm>
+            <a:off x="503999" y="2174973"/>
+            <a:ext cx="9071640" cy="4989240"/>
+          </a:xfrm>
+        </p:spPr>
+        <p:txBody>
+          <a:bodyPr/>
+          <a:lstStyle>
+            <a:defPPr marL="432000" marR="0" lvl="0" indent="-324000">
+              <a:spcBef>
+                <a:spcPts val="0"/>
+              </a:spcBef>
+              <a:spcAft>
+                <a:spcPts val="1414"/>
+              </a:spcAft>
+              <a:buSzPct val="45000"/>
+              <a:buFont typeface="StarSymbol"/>
+              <a:buNone/>
+              <a:defRPr lang="de-DE" sz="3200" b="0" i="0" u="none" strike="noStrike" kern="1200">
+                <a:ln>
+                  <a:noFill/>
+                </a:ln>
+                <a:latin typeface="Arial" pitchFamily="18"/>
+                <a:ea typeface="Microsoft YaHei" pitchFamily="2"/>
+                <a:cs typeface="Lucida Sans" pitchFamily="2"/>
+              </a:defRPr>
+            </a:defPPr>
+            <a:lvl1pPr marL="432000" marR="0" lvl="0" indent="-324000">
+              <a:spcBef>
+                <a:spcPts val="0"/>
+              </a:spcBef>
+              <a:spcAft>
+                <a:spcPts val="1414"/>
+              </a:spcAft>
+              <a:buSzPct val="45000"/>
+              <a:buFont typeface="StarSymbol"/>
+              <a:buChar char="●"/>
+              <a:defRPr lang="de-DE" sz="3200" b="0" i="0" u="none" strike="noStrike" kern="1200">
+                <a:ln>
+                  <a:noFill/>
+                </a:ln>
+                <a:latin typeface="Arial" pitchFamily="18"/>
+                <a:ea typeface="Microsoft YaHei" pitchFamily="2"/>
+                <a:cs typeface="Lucida Sans" pitchFamily="2"/>
+              </a:defRPr>
+            </a:lvl1pPr>
+            <a:lvl2pPr marL="864000" marR="0" lvl="1" indent="-324000">
+              <a:spcBef>
+                <a:spcPts val="0"/>
+              </a:spcBef>
+              <a:spcAft>
+                <a:spcPts val="1134"/>
+              </a:spcAft>
+              <a:buSzPct val="75000"/>
+              <a:buFont typeface="StarSymbol"/>
+              <a:buChar char="–"/>
+              <a:defRPr lang="de-DE" sz="2800" b="0" i="0" u="none" strike="noStrike" kern="1200">
+                <a:ln>
+                  <a:noFill/>
+                </a:ln>
+                <a:latin typeface="Arial" pitchFamily="18"/>
+                <a:ea typeface="Microsoft YaHei" pitchFamily="2"/>
+                <a:cs typeface="Lucida Sans" pitchFamily="2"/>
+              </a:defRPr>
+            </a:lvl2pPr>
+            <a:lvl3pPr marL="1295999" marR="0" lvl="2" indent="-288000">
+              <a:spcBef>
+                <a:spcPts val="0"/>
+              </a:spcBef>
+              <a:spcAft>
+                <a:spcPts val="850"/>
+              </a:spcAft>
+              <a:buSzPct val="45000"/>
+              <a:buFont typeface="StarSymbol"/>
+              <a:buChar char="●"/>
+              <a:defRPr lang="de-DE" sz="2400" b="0" i="0" u="none" strike="noStrike" kern="1200">
+                <a:ln>
+                  <a:noFill/>
+                </a:ln>
+                <a:latin typeface="Arial" pitchFamily="18"/>
+                <a:ea typeface="Microsoft YaHei" pitchFamily="2"/>
+                <a:cs typeface="Lucida Sans" pitchFamily="2"/>
+              </a:defRPr>
+            </a:lvl3pPr>
+            <a:lvl4pPr marL="1728000" marR="0" lvl="3" indent="-216000">
+              <a:spcBef>
+                <a:spcPts val="0"/>
+              </a:spcBef>
+              <a:spcAft>
+                <a:spcPts val="567"/>
+              </a:spcAft>
+              <a:buSzPct val="75000"/>
+              <a:buFont typeface="StarSymbol"/>
+              <a:buChar char="–"/>
+              <a:defRPr lang="de-DE" sz="2000" b="0" i="0" u="none" strike="noStrike" kern="1200">
+                <a:ln>
+                  <a:noFill/>
+                </a:ln>
+                <a:latin typeface="Arial" pitchFamily="18"/>
+                <a:ea typeface="Microsoft YaHei" pitchFamily="2"/>
+                <a:cs typeface="Lucida Sans" pitchFamily="2"/>
+              </a:defRPr>
+            </a:lvl4pPr>
+            <a:lvl5pPr marL="2160000" marR="0" lvl="4" indent="-216000">
+              <a:spcBef>
+                <a:spcPts val="0"/>
+              </a:spcBef>
+              <a:spcAft>
+                <a:spcPts val="283"/>
+              </a:spcAft>
+              <a:buSzPct val="45000"/>
+              <a:buFont typeface="StarSymbol"/>
+              <a:buChar char="●"/>
+              <a:defRPr lang="de-DE" sz="2000" b="0" i="0" u="none" strike="noStrike" kern="1200">
+                <a:ln>
+                  <a:noFill/>
+                </a:ln>
+                <a:latin typeface="Arial" pitchFamily="18"/>
+                <a:ea typeface="Microsoft YaHei" pitchFamily="2"/>
+                <a:cs typeface="Lucida Sans" pitchFamily="2"/>
+              </a:defRPr>
+            </a:lvl5pPr>
+            <a:lvl6pPr marL="2592000" marR="0" lvl="5" indent="-216000">
+              <a:spcBef>
+                <a:spcPts val="0"/>
+              </a:spcBef>
+              <a:spcAft>
+                <a:spcPts val="283"/>
+              </a:spcAft>
+              <a:buSzPct val="45000"/>
+              <a:buFont typeface="StarSymbol"/>
+              <a:buChar char="●"/>
+              <a:defRPr lang="de-DE" sz="2000" b="0" i="0" u="none" strike="noStrike" kern="1200">
+                <a:ln>
+                  <a:noFill/>
+                </a:ln>
+                <a:latin typeface="Arial" pitchFamily="18"/>
+                <a:ea typeface="Microsoft YaHei" pitchFamily="2"/>
+                <a:cs typeface="Lucida Sans" pitchFamily="2"/>
+              </a:defRPr>
+            </a:lvl6pPr>
+            <a:lvl7pPr marL="3024000" marR="0" lvl="6" indent="-216000">
+              <a:spcBef>
+                <a:spcPts val="0"/>
+              </a:spcBef>
+              <a:spcAft>
+                <a:spcPts val="283"/>
+              </a:spcAft>
+              <a:buSzPct val="45000"/>
+              <a:buFont typeface="StarSymbol"/>
+              <a:buChar char="●"/>
+              <a:defRPr lang="de-DE" sz="2000" b="0" i="0" u="none" strike="noStrike" kern="1200">
+                <a:ln>
+                  <a:noFill/>
+                </a:ln>
+                <a:latin typeface="Arial" pitchFamily="18"/>
+                <a:ea typeface="Microsoft YaHei" pitchFamily="2"/>
+                <a:cs typeface="Lucida Sans" pitchFamily="2"/>
+              </a:defRPr>
+            </a:lvl7pPr>
+            <a:lvl8pPr marL="3456000" marR="0" lvl="7" indent="-216000">
+              <a:spcBef>
+                <a:spcPts val="0"/>
+              </a:spcBef>
+              <a:spcAft>
+                <a:spcPts val="283"/>
+              </a:spcAft>
+              <a:buSzPct val="45000"/>
+              <a:buFont typeface="StarSymbol"/>
+              <a:buChar char="●"/>
+              <a:defRPr lang="de-DE" sz="2000" b="0" i="0" u="none" strike="noStrike" kern="1200">
+                <a:ln>
+                  <a:noFill/>
+                </a:ln>
+                <a:latin typeface="Arial" pitchFamily="18"/>
+                <a:ea typeface="Microsoft YaHei" pitchFamily="2"/>
+                <a:cs typeface="Lucida Sans" pitchFamily="2"/>
+              </a:defRPr>
+            </a:lvl8pPr>
+            <a:lvl9pPr marL="3887999" marR="0" lvl="8" indent="-216000">
+              <a:spcBef>
+                <a:spcPts val="0"/>
+              </a:spcBef>
+              <a:spcAft>
+                <a:spcPts val="283"/>
+              </a:spcAft>
+              <a:buSzPct val="45000"/>
+              <a:buFont typeface="StarSymbol"/>
+              <a:buChar char="●"/>
+              <a:defRPr lang="de-DE" sz="2000" b="0" i="0" u="none" strike="noStrike" kern="1200">
+                <a:ln>
+                  <a:noFill/>
+                </a:ln>
+                <a:latin typeface="Arial" pitchFamily="18"/>
+                <a:ea typeface="Microsoft YaHei" pitchFamily="2"/>
+                <a:cs typeface="Lucida Sans" pitchFamily="2"/>
+              </a:defRPr>
+            </a:lvl9pPr>
+          </a:lstStyle>
+          <a:p>
+            <a:pPr lvl="0"/>
+            <a:r>
+              <a:rPr lang="de-DE" dirty="0"/>
+              <a:t>Verschiedene Forms</a:t>
+            </a:r>
+          </a:p>
+          <a:p>
+            <a:pPr lvl="0"/>
+            <a:r>
+              <a:rPr lang="de-DE" dirty="0"/>
+              <a:t>Bug-fixes (UI, SQL-Statement)</a:t>
+            </a:r>
+          </a:p>
+          <a:p>
+            <a:pPr lvl="0"/>
+            <a:r>
+              <a:rPr lang="de-DE" dirty="0"/>
+              <a:t>DB Schnittstelle</a:t>
+            </a:r>
+          </a:p>
+        </p:txBody>
+      </p:sp>
+    </p:spTree>
+  </p:cSld>
+  <p:clrMapOvr>
+    <a:masterClrMapping/>
+  </p:clrMapOvr>
+  <mc:AlternateContent xmlns:mc="http://schemas.openxmlformats.org/markup-compatibility/2006" xmlns:p14="http://schemas.microsoft.com/office/powerpoint/2010/main">
+    <mc:Choice Requires="p14">
+      <p:transition spd="slow" p14:dur="2000"/>
+    </mc:Choice>
+    <mc:Fallback xmlns="">
+      <p:transition spd="slow"/>
+    </mc:Fallback>
+  </mc:AlternateContent>
+  <p:timing>
+    <p:tnLst>
+      <p:par>
+        <p:cTn id="1" dur="indefinite" restart="never" nodeType="tmRoot"/>
+      </p:par>
+    </p:tnLst>
+  </p:timing>
+</p:sld>
+</file>
+
+<file path=ppt/slides/slide13.xml><?xml version="1.0" encoding="utf-8"?>
 <p:sld xmlns:a="http://schemas.openxmlformats.org/drawingml/2006/main" xmlns:r="http://schemas.openxmlformats.org/officeDocument/2006/relationships" xmlns:p="http://schemas.openxmlformats.org/presentationml/2006/main">
   <p:cSld name="page10">
     <p:spTree>
@@ -5271,11 +6483,11 @@
   <p:clrMapOvr>
     <a:masterClrMapping/>
   </p:clrMapOvr>
-  <mc:AlternateContent xmlns:mc="http://schemas.openxmlformats.org/markup-compatibility/2006">
-    <mc:Choice xmlns:p14="http://schemas.microsoft.com/office/powerpoint/2010/main" Requires="p14">
+  <mc:AlternateContent xmlns:mc="http://schemas.openxmlformats.org/markup-compatibility/2006" xmlns:p14="http://schemas.microsoft.com/office/powerpoint/2010/main">
+    <mc:Choice Requires="p14">
       <p:transition spd="slow" p14:dur="2000"/>
     </mc:Choice>
-    <mc:Fallback>
+    <mc:Fallback xmlns="">
       <p:transition spd="slow"/>
     </mc:Fallback>
   </mc:AlternateContent>
@@ -5289,7 +6501,7 @@
 </p:sld>
 </file>
 
-<file path=ppt/slides/slide11.xml><?xml version="1.0" encoding="utf-8"?>
+<file path=ppt/slides/slide14.xml><?xml version="1.0" encoding="utf-8"?>
 <p:sld xmlns:a="http://schemas.openxmlformats.org/drawingml/2006/main" xmlns:r="http://schemas.openxmlformats.org/officeDocument/2006/relationships" xmlns:p="http://schemas.openxmlformats.org/presentationml/2006/main">
   <p:cSld name="page11">
     <p:spTree>
@@ -5487,11 +6699,11 @@
   <p:clrMapOvr>
     <a:masterClrMapping/>
   </p:clrMapOvr>
-  <mc:AlternateContent xmlns:mc="http://schemas.openxmlformats.org/markup-compatibility/2006">
-    <mc:Choice xmlns:p14="http://schemas.microsoft.com/office/powerpoint/2010/main" Requires="p14">
+  <mc:AlternateContent xmlns:mc="http://schemas.openxmlformats.org/markup-compatibility/2006" xmlns:p14="http://schemas.microsoft.com/office/powerpoint/2010/main">
+    <mc:Choice Requires="p14">
       <p:transition spd="slow" p14:dur="2000"/>
     </mc:Choice>
-    <mc:Fallback>
+    <mc:Fallback xmlns="">
       <p:transition spd="slow"/>
     </mc:Fallback>
   </mc:AlternateContent>
@@ -5505,7 +6717,7 @@
 </p:sld>
 </file>
 
-<file path=ppt/slides/slide12.xml><?xml version="1.0" encoding="utf-8"?>
+<file path=ppt/slides/slide15.xml><?xml version="1.0" encoding="utf-8"?>
 <p:sld xmlns:a="http://schemas.openxmlformats.org/drawingml/2006/main" xmlns:r="http://schemas.openxmlformats.org/officeDocument/2006/relationships" xmlns:p="http://schemas.openxmlformats.org/presentationml/2006/main">
   <p:cSld name="page12">
     <p:spTree>
@@ -5703,11 +6915,11 @@
   <p:clrMapOvr>
     <a:masterClrMapping/>
   </p:clrMapOvr>
-  <mc:AlternateContent xmlns:mc="http://schemas.openxmlformats.org/markup-compatibility/2006">
-    <mc:Choice xmlns:p14="http://schemas.microsoft.com/office/powerpoint/2010/main" Requires="p14">
+  <mc:AlternateContent xmlns:mc="http://schemas.openxmlformats.org/markup-compatibility/2006" xmlns:p14="http://schemas.microsoft.com/office/powerpoint/2010/main">
+    <mc:Choice Requires="p14">
       <p:transition spd="slow" p14:dur="2000"/>
     </mc:Choice>
-    <mc:Fallback>
+    <mc:Fallback xmlns="">
       <p:transition spd="slow"/>
     </mc:Fallback>
   </mc:AlternateContent>
@@ -5721,7 +6933,7 @@
 </p:sld>
 </file>
 
-<file path=ppt/slides/slide13.xml><?xml version="1.0" encoding="utf-8"?>
+<file path=ppt/slides/slide16.xml><?xml version="1.0" encoding="utf-8"?>
 <p:sld xmlns:a="http://schemas.openxmlformats.org/drawingml/2006/main" xmlns:r="http://schemas.openxmlformats.org/officeDocument/2006/relationships" xmlns:p="http://schemas.openxmlformats.org/presentationml/2006/main">
   <p:cSld>
     <p:spTree>
@@ -5883,11 +7095,11 @@
   <p:clrMapOvr>
     <a:masterClrMapping/>
   </p:clrMapOvr>
-  <mc:AlternateContent xmlns:mc="http://schemas.openxmlformats.org/markup-compatibility/2006">
-    <mc:Choice xmlns:p14="http://schemas.microsoft.com/office/powerpoint/2010/main" Requires="p14">
+  <mc:AlternateContent xmlns:mc="http://schemas.openxmlformats.org/markup-compatibility/2006" xmlns:p14="http://schemas.microsoft.com/office/powerpoint/2010/main">
+    <mc:Choice Requires="p14">
       <p:transition spd="slow" p14:dur="2000"/>
     </mc:Choice>
-    <mc:Fallback>
+    <mc:Fallback xmlns="">
       <p:transition spd="slow"/>
     </mc:Fallback>
   </mc:AlternateContent>
@@ -6762,11 +7974,11 @@
   <p:clrMapOvr>
     <a:masterClrMapping/>
   </p:clrMapOvr>
-  <mc:AlternateContent xmlns:mc="http://schemas.openxmlformats.org/markup-compatibility/2006">
-    <mc:Choice xmlns:p14="http://schemas.microsoft.com/office/powerpoint/2010/main" Requires="p14">
+  <mc:AlternateContent xmlns:mc="http://schemas.openxmlformats.org/markup-compatibility/2006" xmlns:p14="http://schemas.microsoft.com/office/powerpoint/2010/main">
+    <mc:Choice Requires="p14">
       <p:transition spd="slow" p14:dur="2000"/>
     </mc:Choice>
-    <mc:Fallback>
+    <mc:Fallback xmlns="">
       <p:transition spd="slow"/>
     </mc:Fallback>
   </mc:AlternateContent>
@@ -7150,11 +8362,11 @@
   <p:clrMapOvr>
     <a:masterClrMapping/>
   </p:clrMapOvr>
-  <mc:AlternateContent xmlns:mc="http://schemas.openxmlformats.org/markup-compatibility/2006">
-    <mc:Choice xmlns:p14="http://schemas.microsoft.com/office/powerpoint/2010/main" Requires="p14">
+  <mc:AlternateContent xmlns:mc="http://schemas.openxmlformats.org/markup-compatibility/2006" xmlns:p14="http://schemas.microsoft.com/office/powerpoint/2010/main">
+    <mc:Choice Requires="p14">
       <p:transition spd="slow" p14:dur="2000"/>
     </mc:Choice>
-    <mc:Fallback>
+    <mc:Fallback xmlns="">
       <p:transition spd="slow"/>
     </mc:Fallback>
   </mc:AlternateContent>
@@ -7539,7 +8751,7 @@
       </p:sp>
       <p:pic>
         <p:nvPicPr>
-          <p:cNvPr id="4" name=""/>
+          <p:cNvPr id="4" name="Рисунок 3"/>
           <p:cNvPicPr>
             <a:picLocks noChangeAspect="1"/>
           </p:cNvPicPr>
@@ -7571,7 +8783,7 @@
       </p:pic>
       <p:pic>
         <p:nvPicPr>
-          <p:cNvPr id="5" name=""/>
+          <p:cNvPr id="5" name="Рисунок 4"/>
           <p:cNvPicPr>
             <a:picLocks noChangeAspect="1"/>
           </p:cNvPicPr>
@@ -7603,7 +8815,7 @@
       </p:pic>
       <p:pic>
         <p:nvPicPr>
-          <p:cNvPr id="6" name=""/>
+          <p:cNvPr id="6" name="Рисунок 5"/>
           <p:cNvPicPr>
             <a:picLocks noChangeAspect="1"/>
           </p:cNvPicPr>
@@ -7638,11 +8850,11 @@
   <p:clrMapOvr>
     <a:masterClrMapping/>
   </p:clrMapOvr>
-  <mc:AlternateContent xmlns:mc="http://schemas.openxmlformats.org/markup-compatibility/2006">
-    <mc:Choice xmlns:p14="http://schemas.microsoft.com/office/powerpoint/2010/main" Requires="p14">
+  <mc:AlternateContent xmlns:mc="http://schemas.openxmlformats.org/markup-compatibility/2006" xmlns:p14="http://schemas.microsoft.com/office/powerpoint/2010/main">
+    <mc:Choice Requires="p14">
       <p:transition spd="slow" p14:dur="2000"/>
     </mc:Choice>
-    <mc:Fallback>
+    <mc:Fallback xmlns="">
       <p:transition spd="slow"/>
     </mc:Fallback>
   </mc:AlternateContent>
@@ -7658,7 +8870,7 @@
 
 <file path=ppt/slides/slide5.xml><?xml version="1.0" encoding="utf-8"?>
 <p:sld xmlns:a="http://schemas.openxmlformats.org/drawingml/2006/main" xmlns:r="http://schemas.openxmlformats.org/officeDocument/2006/relationships" xmlns:p="http://schemas.openxmlformats.org/presentationml/2006/main">
-  <p:cSld name="page5">
+  <p:cSld>
     <p:spTree>
       <p:nvGrpSpPr>
         <p:cNvPr id="1" name=""/>
@@ -7675,7 +8887,7 @@
       </p:grpSpPr>
       <p:sp>
         <p:nvSpPr>
-          <p:cNvPr id="6" name="Прямоугольник 5"/>
+          <p:cNvPr id="10" name="Прямоугольник 9"/>
           <p:cNvSpPr/>
           <p:nvPr/>
         </p:nvSpPr>
@@ -7789,49 +9001,114 @@
               <a:buNone/>
             </a:pPr>
             <a:r>
-              <a:rPr lang="de-DE" b="1" dirty="0"/>
-              <a:t>Klassendiagramm</a:t>
-            </a:r>
+              <a:rPr lang="de-DE" b="1" dirty="0" smtClean="0"/>
+              <a:t>Softwareeinführung </a:t>
+            </a:r>
+            <a:r>
+              <a:rPr lang="de-DE" b="1" dirty="0" err="1"/>
+              <a:t>methode</a:t>
+            </a:r>
+            <a:endParaRPr lang="de-DE" b="1" dirty="0"/>
           </a:p>
         </p:txBody>
       </p:sp>
       <p:pic>
         <p:nvPicPr>
-          <p:cNvPr id="3" name=""/>
+          <p:cNvPr id="1028" name="Picture 4" descr="Bildergebnis fÃ¼r scrum"/>
           <p:cNvPicPr>
-            <a:picLocks noGrp="1" noChangeAspect="1"/>
+            <a:picLocks noChangeAspect="1" noChangeArrowheads="1"/>
           </p:cNvPicPr>
-          <p:nvPr>
-            <p:ph type="pic" idx="4294967295"/>
-          </p:nvPr>
+          <p:nvPr/>
         </p:nvPicPr>
         <p:blipFill>
           <a:blip r:embed="rId3">
-            <a:lum/>
-            <a:alphaModFix/>
+            <a:extLst>
+              <a:ext uri="{28A0092B-C50C-407E-A947-70E740481C1C}">
+                <a14:useLocalDpi xmlns:a14="http://schemas.microsoft.com/office/drawing/2010/main" val="0"/>
+              </a:ext>
+            </a:extLst>
           </a:blip>
           <a:srcRect/>
           <a:stretch>
             <a:fillRect/>
           </a:stretch>
         </p:blipFill>
-        <p:spPr>
+        <p:spPr bwMode="auto">
           <a:xfrm>
-            <a:off x="2349000" y="1768680"/>
-            <a:ext cx="5381279" cy="4989240"/>
+            <a:off x="3224931" y="4057466"/>
+            <a:ext cx="7127229" cy="3563615"/>
           </a:xfrm>
+          <a:prstGeom prst="rect">
+            <a:avLst/>
+          </a:prstGeom>
+          <a:noFill/>
+          <a:extLst>
+            <a:ext uri="{909E8E84-426E-40DD-AFC4-6F175D3DCCD1}">
+              <a14:hiddenFill xmlns:a14="http://schemas.microsoft.com/office/drawing/2010/main">
+                <a:solidFill>
+                  <a:srgbClr val="FFFFFF"/>
+                </a:solidFill>
+              </a14:hiddenFill>
+            </a:ext>
+          </a:extLst>
+        </p:spPr>
+      </p:pic>
+      <p:pic>
+        <p:nvPicPr>
+          <p:cNvPr id="1026" name="Picture 2" descr="Bildergebnis fÃ¼r scrum"/>
+          <p:cNvPicPr>
+            <a:picLocks noChangeAspect="1" noChangeArrowheads="1"/>
+          </p:cNvPicPr>
+          <p:nvPr/>
+        </p:nvPicPr>
+        <p:blipFill>
+          <a:blip r:embed="rId4">
+            <a:extLst>
+              <a:ext uri="{28A0092B-C50C-407E-A947-70E740481C1C}">
+                <a14:useLocalDpi xmlns:a14="http://schemas.microsoft.com/office/drawing/2010/main" val="0"/>
+              </a:ext>
+            </a:extLst>
+          </a:blip>
+          <a:srcRect/>
+          <a:stretch>
+            <a:fillRect/>
+          </a:stretch>
+        </p:blipFill>
+        <p:spPr bwMode="auto">
+          <a:xfrm>
+            <a:off x="164107" y="1835622"/>
+            <a:ext cx="3940101" cy="4003652"/>
+          </a:xfrm>
+          <a:prstGeom prst="rect">
+            <a:avLst/>
+          </a:prstGeom>
+          <a:noFill/>
+          <a:extLst>
+            <a:ext uri="{909E8E84-426E-40DD-AFC4-6F175D3DCCD1}">
+              <a14:hiddenFill xmlns:a14="http://schemas.microsoft.com/office/drawing/2010/main">
+                <a:solidFill>
+                  <a:srgbClr val="FFFFFF"/>
+                </a:solidFill>
+              </a14:hiddenFill>
+            </a:ext>
+          </a:extLst>
         </p:spPr>
       </p:pic>
     </p:spTree>
+    <p:extLst>
+      <p:ext uri="{BB962C8B-B14F-4D97-AF65-F5344CB8AC3E}">
+        <p14:creationId xmlns:p14="http://schemas.microsoft.com/office/powerpoint/2010/main" val="194216654"/>
+      </p:ext>
+    </p:extLst>
   </p:cSld>
   <p:clrMapOvr>
     <a:masterClrMapping/>
   </p:clrMapOvr>
-  <mc:AlternateContent xmlns:mc="http://schemas.openxmlformats.org/markup-compatibility/2006">
-    <mc:Choice xmlns:p14="http://schemas.microsoft.com/office/powerpoint/2010/main" Requires="p14">
+  <mc:AlternateContent xmlns:mc="http://schemas.openxmlformats.org/markup-compatibility/2006" xmlns:p14="http://schemas.microsoft.com/office/powerpoint/2010/main">
+    <mc:Choice Requires="p14">
       <p:transition spd="slow" p14:dur="2000"/>
     </mc:Choice>
-    <mc:Fallback>
+    <mc:Fallback xmlns="">
       <p:transition spd="slow"/>
     </mc:Fallback>
   </mc:AlternateContent>
@@ -7847,7 +9124,7 @@
 
 <file path=ppt/slides/slide6.xml><?xml version="1.0" encoding="utf-8"?>
 <p:sld xmlns:a="http://schemas.openxmlformats.org/drawingml/2006/main" xmlns:r="http://schemas.openxmlformats.org/officeDocument/2006/relationships" xmlns:p="http://schemas.openxmlformats.org/presentationml/2006/main">
-  <p:cSld name="page6">
+  <p:cSld>
     <p:spTree>
       <p:nvGrpSpPr>
         <p:cNvPr id="1" name=""/>
@@ -7864,7 +9141,7 @@
       </p:grpSpPr>
       <p:sp>
         <p:nvSpPr>
-          <p:cNvPr id="6" name="Прямоугольник 5"/>
+          <p:cNvPr id="10" name="Прямоугольник 9"/>
           <p:cNvSpPr/>
           <p:nvPr/>
         </p:nvSpPr>
@@ -7978,49 +9255,304 @@
               <a:buNone/>
             </a:pPr>
             <a:r>
-              <a:rPr lang="de-DE" b="1" dirty="0"/>
-              <a:t>USE Case</a:t>
-            </a:r>
+              <a:rPr lang="de-DE" b="1" dirty="0" err="1" smtClean="0"/>
+              <a:t>Kanban</a:t>
+            </a:r>
+            <a:r>
+              <a:rPr lang="de-DE" b="1" dirty="0" smtClean="0"/>
+              <a:t> </a:t>
+            </a:r>
+            <a:r>
+              <a:rPr lang="de-DE" b="1" dirty="0" err="1" smtClean="0"/>
+              <a:t>board</a:t>
+            </a:r>
+            <a:endParaRPr lang="de-DE" b="1" dirty="0"/>
           </a:p>
         </p:txBody>
       </p:sp>
       <p:pic>
         <p:nvPicPr>
-          <p:cNvPr id="3" name=""/>
+          <p:cNvPr id="2050" name="Picture 2"/>
           <p:cNvPicPr>
-            <a:picLocks noGrp="1" noChangeAspect="1"/>
+            <a:picLocks noChangeAspect="1" noChangeArrowheads="1"/>
           </p:cNvPicPr>
-          <p:nvPr>
-            <p:ph type="pic" idx="4294967295"/>
-          </p:nvPr>
+          <p:nvPr/>
         </p:nvPicPr>
         <p:blipFill>
           <a:blip r:embed="rId3">
-            <a:lum/>
-            <a:alphaModFix/>
+            <a:extLst>
+              <a:ext uri="{28A0092B-C50C-407E-A947-70E740481C1C}">
+                <a14:useLocalDpi xmlns:a14="http://schemas.microsoft.com/office/drawing/2010/main" val="0"/>
+              </a:ext>
+            </a:extLst>
           </a:blip>
           <a:srcRect/>
           <a:stretch>
             <a:fillRect/>
           </a:stretch>
         </p:blipFill>
+        <p:spPr bwMode="auto">
+          <a:xfrm>
+            <a:off x="143767" y="3555980"/>
+            <a:ext cx="9793089" cy="3352819"/>
+          </a:xfrm>
+          <a:prstGeom prst="rect">
+            <a:avLst/>
+          </a:prstGeom>
+          <a:noFill/>
+          <a:ln>
+            <a:noFill/>
+          </a:ln>
+          <a:extLst>
+            <a:ext uri="{909E8E84-426E-40DD-AFC4-6F175D3DCCD1}">
+              <a14:hiddenFill xmlns:a14="http://schemas.microsoft.com/office/drawing/2010/main">
+                <a:solidFill>
+                  <a:schemeClr val="accent1"/>
+                </a:solidFill>
+              </a14:hiddenFill>
+            </a:ext>
+            <a:ext uri="{91240B29-F687-4F45-9708-019B960494DF}">
+              <a14:hiddenLine xmlns:a14="http://schemas.microsoft.com/office/drawing/2010/main" w="9525">
+                <a:solidFill>
+                  <a:schemeClr val="tx1"/>
+                </a:solidFill>
+                <a:miter lim="800000"/>
+                <a:headEnd/>
+                <a:tailEnd/>
+              </a14:hiddenLine>
+            </a:ext>
+          </a:extLst>
+        </p:spPr>
+      </p:pic>
+      <p:sp>
+        <p:nvSpPr>
+          <p:cNvPr id="3" name="TextBox 2"/>
+          <p:cNvSpPr txBox="1"/>
+          <p:nvPr/>
+        </p:nvSpPr>
         <p:spPr>
           <a:xfrm>
-            <a:off x="1069919" y="1979637"/>
-            <a:ext cx="7939080" cy="4989240"/>
+            <a:off x="806502" y="2393142"/>
+            <a:ext cx="1338828" cy="523220"/>
           </a:xfrm>
+          <a:prstGeom prst="rect">
+            <a:avLst/>
+          </a:prstGeom>
+          <a:noFill/>
         </p:spPr>
-      </p:pic>
+        <p:txBody>
+          <a:bodyPr wrap="none" rtlCol="0">
+            <a:spAutoFit/>
+          </a:bodyPr>
+          <a:lstStyle/>
+          <a:p>
+            <a:r>
+              <a:rPr lang="de-DE" sz="2800" b="1" dirty="0" err="1" smtClean="0"/>
+              <a:t>Backlog</a:t>
+            </a:r>
+            <a:endParaRPr lang="ru-RU" b="1" dirty="0"/>
+          </a:p>
+        </p:txBody>
+      </p:sp>
+      <p:sp>
+        <p:nvSpPr>
+          <p:cNvPr id="8" name="TextBox 7"/>
+          <p:cNvSpPr txBox="1"/>
+          <p:nvPr/>
+        </p:nvSpPr>
+        <p:spPr>
+          <a:xfrm>
+            <a:off x="4137182" y="2377671"/>
+            <a:ext cx="1824154" cy="523220"/>
+          </a:xfrm>
+          <a:prstGeom prst="rect">
+            <a:avLst/>
+          </a:prstGeom>
+          <a:noFill/>
+        </p:spPr>
+        <p:txBody>
+          <a:bodyPr wrap="none" rtlCol="0">
+            <a:spAutoFit/>
+          </a:bodyPr>
+          <a:lstStyle/>
+          <a:p>
+            <a:r>
+              <a:rPr lang="de-DE" sz="2800" b="1" dirty="0" smtClean="0"/>
+              <a:t>In </a:t>
+            </a:r>
+            <a:r>
+              <a:rPr lang="de-DE" sz="2800" b="1" dirty="0" err="1" smtClean="0"/>
+              <a:t>progress</a:t>
+            </a:r>
+            <a:endParaRPr lang="ru-RU" sz="2800" b="1" dirty="0"/>
+          </a:p>
+        </p:txBody>
+      </p:sp>
+      <p:sp>
+        <p:nvSpPr>
+          <p:cNvPr id="9" name="TextBox 8"/>
+          <p:cNvSpPr txBox="1"/>
+          <p:nvPr/>
+        </p:nvSpPr>
+        <p:spPr>
+          <a:xfrm>
+            <a:off x="7828401" y="2393142"/>
+            <a:ext cx="976549" cy="523220"/>
+          </a:xfrm>
+          <a:prstGeom prst="rect">
+            <a:avLst/>
+          </a:prstGeom>
+          <a:noFill/>
+        </p:spPr>
+        <p:txBody>
+          <a:bodyPr wrap="none" rtlCol="0">
+            <a:spAutoFit/>
+          </a:bodyPr>
+          <a:lstStyle/>
+          <a:p>
+            <a:r>
+              <a:rPr lang="de-DE" sz="2800" b="1" dirty="0" err="1" smtClean="0"/>
+              <a:t>Done</a:t>
+            </a:r>
+            <a:endParaRPr lang="ru-RU" sz="2800" b="1" dirty="0"/>
+          </a:p>
+        </p:txBody>
+      </p:sp>
+      <p:sp>
+        <p:nvSpPr>
+          <p:cNvPr id="4" name="Стрелка вниз 3"/>
+          <p:cNvSpPr/>
+          <p:nvPr/>
+        </p:nvSpPr>
+        <p:spPr>
+          <a:xfrm>
+            <a:off x="1367904" y="3059757"/>
+            <a:ext cx="216024" cy="432048"/>
+          </a:xfrm>
+          <a:prstGeom prst="downArrow">
+            <a:avLst/>
+          </a:prstGeom>
+        </p:spPr>
+        <p:style>
+          <a:lnRef idx="2">
+            <a:schemeClr val="dk1">
+              <a:shade val="50000"/>
+            </a:schemeClr>
+          </a:lnRef>
+          <a:fillRef idx="1">
+            <a:schemeClr val="dk1"/>
+          </a:fillRef>
+          <a:effectRef idx="0">
+            <a:schemeClr val="dk1"/>
+          </a:effectRef>
+          <a:fontRef idx="minor">
+            <a:schemeClr val="lt1"/>
+          </a:fontRef>
+        </p:style>
+        <p:txBody>
+          <a:bodyPr rtlCol="0" anchor="ctr"/>
+          <a:lstStyle/>
+          <a:p>
+            <a:pPr algn="ctr"/>
+            <a:endParaRPr lang="ru-RU"/>
+          </a:p>
+        </p:txBody>
+      </p:sp>
+      <p:sp>
+        <p:nvSpPr>
+          <p:cNvPr id="12" name="Стрелка вниз 11"/>
+          <p:cNvSpPr/>
+          <p:nvPr/>
+        </p:nvSpPr>
+        <p:spPr>
+          <a:xfrm>
+            <a:off x="4932299" y="3059757"/>
+            <a:ext cx="216024" cy="432048"/>
+          </a:xfrm>
+          <a:prstGeom prst="downArrow">
+            <a:avLst/>
+          </a:prstGeom>
+        </p:spPr>
+        <p:style>
+          <a:lnRef idx="2">
+            <a:schemeClr val="dk1">
+              <a:shade val="50000"/>
+            </a:schemeClr>
+          </a:lnRef>
+          <a:fillRef idx="1">
+            <a:schemeClr val="dk1"/>
+          </a:fillRef>
+          <a:effectRef idx="0">
+            <a:schemeClr val="dk1"/>
+          </a:effectRef>
+          <a:fontRef idx="minor">
+            <a:schemeClr val="lt1"/>
+          </a:fontRef>
+        </p:style>
+        <p:txBody>
+          <a:bodyPr rtlCol="0" anchor="ctr"/>
+          <a:lstStyle/>
+          <a:p>
+            <a:pPr algn="ctr"/>
+            <a:endParaRPr lang="ru-RU"/>
+          </a:p>
+        </p:txBody>
+      </p:sp>
+      <p:sp>
+        <p:nvSpPr>
+          <p:cNvPr id="13" name="Стрелка вниз 12"/>
+          <p:cNvSpPr/>
+          <p:nvPr/>
+        </p:nvSpPr>
+        <p:spPr>
+          <a:xfrm>
+            <a:off x="8208664" y="3046362"/>
+            <a:ext cx="216024" cy="432048"/>
+          </a:xfrm>
+          <a:prstGeom prst="downArrow">
+            <a:avLst/>
+          </a:prstGeom>
+        </p:spPr>
+        <p:style>
+          <a:lnRef idx="2">
+            <a:schemeClr val="dk1">
+              <a:shade val="50000"/>
+            </a:schemeClr>
+          </a:lnRef>
+          <a:fillRef idx="1">
+            <a:schemeClr val="dk1"/>
+          </a:fillRef>
+          <a:effectRef idx="0">
+            <a:schemeClr val="dk1"/>
+          </a:effectRef>
+          <a:fontRef idx="minor">
+            <a:schemeClr val="lt1"/>
+          </a:fontRef>
+        </p:style>
+        <p:txBody>
+          <a:bodyPr rtlCol="0" anchor="ctr"/>
+          <a:lstStyle/>
+          <a:p>
+            <a:pPr algn="ctr"/>
+            <a:endParaRPr lang="ru-RU"/>
+          </a:p>
+        </p:txBody>
+      </p:sp>
     </p:spTree>
+    <p:extLst>
+      <p:ext uri="{BB962C8B-B14F-4D97-AF65-F5344CB8AC3E}">
+        <p14:creationId xmlns:p14="http://schemas.microsoft.com/office/powerpoint/2010/main" val="2186747057"/>
+      </p:ext>
+    </p:extLst>
   </p:cSld>
   <p:clrMapOvr>
     <a:masterClrMapping/>
   </p:clrMapOvr>
-  <mc:AlternateContent xmlns:mc="http://schemas.openxmlformats.org/markup-compatibility/2006">
-    <mc:Choice xmlns:p14="http://schemas.microsoft.com/office/powerpoint/2010/main" Requires="p14">
+  <mc:AlternateContent xmlns:mc="http://schemas.openxmlformats.org/markup-compatibility/2006" xmlns:p14="http://schemas.microsoft.com/office/powerpoint/2010/main">
+    <mc:Choice Requires="p14">
       <p:transition spd="slow" p14:dur="2000"/>
     </mc:Choice>
-    <mc:Fallback>
+    <mc:Fallback xmlns="">
       <p:transition spd="slow"/>
     </mc:Fallback>
   </mc:AlternateContent>
@@ -8035,8 +9567,8 @@
 </file>
 
 <file path=ppt/slides/slide7.xml><?xml version="1.0" encoding="utf-8"?>
-<p:sld xmlns:a="http://schemas.openxmlformats.org/drawingml/2006/main" xmlns:r="http://schemas.openxmlformats.org/officeDocument/2006/relationships" xmlns:p="http://schemas.openxmlformats.org/presentationml/2006/main" show="0">
-  <p:cSld name="page7">
+<p:sld xmlns:a="http://schemas.openxmlformats.org/drawingml/2006/main" xmlns:r="http://schemas.openxmlformats.org/officeDocument/2006/relationships" xmlns:p="http://schemas.openxmlformats.org/presentationml/2006/main">
+  <p:cSld>
     <p:spTree>
       <p:nvGrpSpPr>
         <p:cNvPr id="1" name=""/>
@@ -8053,7 +9585,7 @@
       </p:grpSpPr>
       <p:sp>
         <p:nvSpPr>
-          <p:cNvPr id="6" name="Прямоугольник 5"/>
+          <p:cNvPr id="10" name="Прямоугольник 9"/>
           <p:cNvSpPr/>
           <p:nvPr/>
         </p:nvSpPr>
@@ -8167,49 +9699,73 @@
               <a:buNone/>
             </a:pPr>
             <a:r>
-              <a:rPr lang="de-DE" b="1" dirty="0"/>
-              <a:t>Entity relationship modell</a:t>
-            </a:r>
+              <a:rPr lang="en-US" dirty="0" err="1"/>
+              <a:t>Versionskontrollsystem</a:t>
+            </a:r>
+            <a:r>
+              <a:rPr lang="en-US" dirty="0"/>
+              <a:t> </a:t>
+            </a:r>
+            <a:endParaRPr lang="de-DE" b="1" dirty="0"/>
           </a:p>
         </p:txBody>
       </p:sp>
       <p:pic>
         <p:nvPicPr>
-          <p:cNvPr id="3" name=""/>
+          <p:cNvPr id="3074" name="Picture 2" descr="Bildergebnis fÃ¼r Github"/>
           <p:cNvPicPr>
-            <a:picLocks noGrp="1" noChangeAspect="1"/>
+            <a:picLocks noChangeAspect="1" noChangeArrowheads="1"/>
           </p:cNvPicPr>
-          <p:nvPr>
-            <p:ph type="pic" idx="4294967295"/>
-          </p:nvPr>
+          <p:nvPr/>
         </p:nvPicPr>
         <p:blipFill>
           <a:blip r:embed="rId3">
-            <a:lum/>
-            <a:alphaModFix/>
+            <a:extLst>
+              <a:ext uri="{28A0092B-C50C-407E-A947-70E740481C1C}">
+                <a14:useLocalDpi xmlns:a14="http://schemas.microsoft.com/office/drawing/2010/main" val="0"/>
+              </a:ext>
+            </a:extLst>
           </a:blip>
           <a:srcRect/>
           <a:stretch>
             <a:fillRect/>
           </a:stretch>
         </p:blipFill>
-        <p:spPr>
+        <p:spPr bwMode="auto">
           <a:xfrm>
-            <a:off x="503640" y="2232509"/>
-            <a:ext cx="9071640" cy="4355640"/>
+            <a:off x="475960" y="1606550"/>
+            <a:ext cx="9134475" cy="5953125"/>
           </a:xfrm>
+          <a:prstGeom prst="rect">
+            <a:avLst/>
+          </a:prstGeom>
+          <a:noFill/>
+          <a:extLst>
+            <a:ext uri="{909E8E84-426E-40DD-AFC4-6F175D3DCCD1}">
+              <a14:hiddenFill xmlns:a14="http://schemas.microsoft.com/office/drawing/2010/main">
+                <a:solidFill>
+                  <a:srgbClr val="FFFFFF"/>
+                </a:solidFill>
+              </a14:hiddenFill>
+            </a:ext>
+          </a:extLst>
         </p:spPr>
       </p:pic>
     </p:spTree>
+    <p:extLst>
+      <p:ext uri="{BB962C8B-B14F-4D97-AF65-F5344CB8AC3E}">
+        <p14:creationId xmlns:p14="http://schemas.microsoft.com/office/powerpoint/2010/main" val="2264602875"/>
+      </p:ext>
+    </p:extLst>
   </p:cSld>
   <p:clrMapOvr>
     <a:masterClrMapping/>
   </p:clrMapOvr>
-  <mc:AlternateContent xmlns:mc="http://schemas.openxmlformats.org/markup-compatibility/2006">
-    <mc:Choice xmlns:p14="http://schemas.microsoft.com/office/powerpoint/2010/main" Requires="p14">
+  <mc:AlternateContent xmlns:mc="http://schemas.openxmlformats.org/markup-compatibility/2006" xmlns:p14="http://schemas.microsoft.com/office/powerpoint/2010/main">
+    <mc:Choice Requires="p14">
       <p:transition spd="slow" p14:dur="2000"/>
     </mc:Choice>
-    <mc:Fallback>
+    <mc:Fallback xmlns="">
       <p:transition spd="slow"/>
     </mc:Fallback>
   </mc:AlternateContent>
@@ -8225,7 +9781,7 @@
 
 <file path=ppt/slides/slide8.xml><?xml version="1.0" encoding="utf-8"?>
 <p:sld xmlns:a="http://schemas.openxmlformats.org/drawingml/2006/main" xmlns:r="http://schemas.openxmlformats.org/officeDocument/2006/relationships" xmlns:p="http://schemas.openxmlformats.org/presentationml/2006/main">
-  <p:cSld name="page8">
+  <p:cSld name="page5">
     <p:spTree>
       <p:nvGrpSpPr>
         <p:cNvPr id="1" name=""/>
@@ -8357,268 +9913,48 @@
             </a:pPr>
             <a:r>
               <a:rPr lang="de-DE" b="1" dirty="0"/>
-              <a:t>Umsetzung</a:t>
-            </a:r>
-          </a:p>
-        </p:txBody>
-      </p:sp>
-      <p:sp>
-        <p:nvSpPr>
-          <p:cNvPr id="3" name="Текст 2"/>
-          <p:cNvSpPr txBox="1">
-            <a:spLocks noGrp="1"/>
-          </p:cNvSpPr>
-          <p:nvPr>
-            <p:ph type="body" idx="4294967295"/>
-          </p:nvPr>
-        </p:nvSpPr>
+              <a:t>Klassendiagramm</a:t>
+            </a:r>
+          </a:p>
+        </p:txBody>
+      </p:sp>
+      <p:pic>
+        <p:nvPicPr>
+          <p:cNvPr id="3" name="Рисунок 2"/>
+          <p:cNvPicPr>
+            <a:picLocks noGrp="1" noChangeAspect="1"/>
+          </p:cNvPicPr>
+          <p:nvPr>
+            <p:ph type="pic" idx="4294967295"/>
+          </p:nvPr>
+        </p:nvPicPr>
+        <p:blipFill>
+          <a:blip r:embed="rId3">
+            <a:lum/>
+            <a:alphaModFix/>
+          </a:blip>
+          <a:srcRect/>
+          <a:stretch>
+            <a:fillRect/>
+          </a:stretch>
+        </p:blipFill>
         <p:spPr>
           <a:xfrm>
-            <a:off x="503999" y="2246981"/>
-            <a:ext cx="9071640" cy="4989240"/>
+            <a:off x="2349000" y="1768680"/>
+            <a:ext cx="5381279" cy="4989240"/>
           </a:xfrm>
         </p:spPr>
-        <p:txBody>
-          <a:bodyPr/>
-          <a:lstStyle>
-            <a:defPPr marL="432000" marR="0" lvl="0" indent="-324000">
-              <a:spcBef>
-                <a:spcPts val="0"/>
-              </a:spcBef>
-              <a:spcAft>
-                <a:spcPts val="1414"/>
-              </a:spcAft>
-              <a:buSzPct val="45000"/>
-              <a:buFont typeface="StarSymbol"/>
-              <a:buNone/>
-              <a:defRPr lang="de-DE" sz="3200" b="0" i="0" u="none" strike="noStrike" kern="1200">
-                <a:ln>
-                  <a:noFill/>
-                </a:ln>
-                <a:latin typeface="Arial" pitchFamily="18"/>
-                <a:ea typeface="Microsoft YaHei" pitchFamily="2"/>
-                <a:cs typeface="Lucida Sans" pitchFamily="2"/>
-              </a:defRPr>
-            </a:defPPr>
-            <a:lvl1pPr marL="432000" marR="0" lvl="0" indent="-324000">
-              <a:spcBef>
-                <a:spcPts val="0"/>
-              </a:spcBef>
-              <a:spcAft>
-                <a:spcPts val="1414"/>
-              </a:spcAft>
-              <a:buSzPct val="45000"/>
-              <a:buFont typeface="StarSymbol"/>
-              <a:buChar char="●"/>
-              <a:defRPr lang="de-DE" sz="3200" b="0" i="0" u="none" strike="noStrike" kern="1200">
-                <a:ln>
-                  <a:noFill/>
-                </a:ln>
-                <a:latin typeface="Arial" pitchFamily="18"/>
-                <a:ea typeface="Microsoft YaHei" pitchFamily="2"/>
-                <a:cs typeface="Lucida Sans" pitchFamily="2"/>
-              </a:defRPr>
-            </a:lvl1pPr>
-            <a:lvl2pPr marL="864000" marR="0" lvl="1" indent="-324000">
-              <a:spcBef>
-                <a:spcPts val="0"/>
-              </a:spcBef>
-              <a:spcAft>
-                <a:spcPts val="1134"/>
-              </a:spcAft>
-              <a:buSzPct val="75000"/>
-              <a:buFont typeface="StarSymbol"/>
-              <a:buChar char="–"/>
-              <a:defRPr lang="de-DE" sz="2800" b="0" i="0" u="none" strike="noStrike" kern="1200">
-                <a:ln>
-                  <a:noFill/>
-                </a:ln>
-                <a:latin typeface="Arial" pitchFamily="18"/>
-                <a:ea typeface="Microsoft YaHei" pitchFamily="2"/>
-                <a:cs typeface="Lucida Sans" pitchFamily="2"/>
-              </a:defRPr>
-            </a:lvl2pPr>
-            <a:lvl3pPr marL="1295999" marR="0" lvl="2" indent="-288000">
-              <a:spcBef>
-                <a:spcPts val="0"/>
-              </a:spcBef>
-              <a:spcAft>
-                <a:spcPts val="850"/>
-              </a:spcAft>
-              <a:buSzPct val="45000"/>
-              <a:buFont typeface="StarSymbol"/>
-              <a:buChar char="●"/>
-              <a:defRPr lang="de-DE" sz="2400" b="0" i="0" u="none" strike="noStrike" kern="1200">
-                <a:ln>
-                  <a:noFill/>
-                </a:ln>
-                <a:latin typeface="Arial" pitchFamily="18"/>
-                <a:ea typeface="Microsoft YaHei" pitchFamily="2"/>
-                <a:cs typeface="Lucida Sans" pitchFamily="2"/>
-              </a:defRPr>
-            </a:lvl3pPr>
-            <a:lvl4pPr marL="1728000" marR="0" lvl="3" indent="-216000">
-              <a:spcBef>
-                <a:spcPts val="0"/>
-              </a:spcBef>
-              <a:spcAft>
-                <a:spcPts val="567"/>
-              </a:spcAft>
-              <a:buSzPct val="75000"/>
-              <a:buFont typeface="StarSymbol"/>
-              <a:buChar char="–"/>
-              <a:defRPr lang="de-DE" sz="2000" b="0" i="0" u="none" strike="noStrike" kern="1200">
-                <a:ln>
-                  <a:noFill/>
-                </a:ln>
-                <a:latin typeface="Arial" pitchFamily="18"/>
-                <a:ea typeface="Microsoft YaHei" pitchFamily="2"/>
-                <a:cs typeface="Lucida Sans" pitchFamily="2"/>
-              </a:defRPr>
-            </a:lvl4pPr>
-            <a:lvl5pPr marL="2160000" marR="0" lvl="4" indent="-216000">
-              <a:spcBef>
-                <a:spcPts val="0"/>
-              </a:spcBef>
-              <a:spcAft>
-                <a:spcPts val="283"/>
-              </a:spcAft>
-              <a:buSzPct val="45000"/>
-              <a:buFont typeface="StarSymbol"/>
-              <a:buChar char="●"/>
-              <a:defRPr lang="de-DE" sz="2000" b="0" i="0" u="none" strike="noStrike" kern="1200">
-                <a:ln>
-                  <a:noFill/>
-                </a:ln>
-                <a:latin typeface="Arial" pitchFamily="18"/>
-                <a:ea typeface="Microsoft YaHei" pitchFamily="2"/>
-                <a:cs typeface="Lucida Sans" pitchFamily="2"/>
-              </a:defRPr>
-            </a:lvl5pPr>
-            <a:lvl6pPr marL="2592000" marR="0" lvl="5" indent="-216000">
-              <a:spcBef>
-                <a:spcPts val="0"/>
-              </a:spcBef>
-              <a:spcAft>
-                <a:spcPts val="283"/>
-              </a:spcAft>
-              <a:buSzPct val="45000"/>
-              <a:buFont typeface="StarSymbol"/>
-              <a:buChar char="●"/>
-              <a:defRPr lang="de-DE" sz="2000" b="0" i="0" u="none" strike="noStrike" kern="1200">
-                <a:ln>
-                  <a:noFill/>
-                </a:ln>
-                <a:latin typeface="Arial" pitchFamily="18"/>
-                <a:ea typeface="Microsoft YaHei" pitchFamily="2"/>
-                <a:cs typeface="Lucida Sans" pitchFamily="2"/>
-              </a:defRPr>
-            </a:lvl6pPr>
-            <a:lvl7pPr marL="3024000" marR="0" lvl="6" indent="-216000">
-              <a:spcBef>
-                <a:spcPts val="0"/>
-              </a:spcBef>
-              <a:spcAft>
-                <a:spcPts val="283"/>
-              </a:spcAft>
-              <a:buSzPct val="45000"/>
-              <a:buFont typeface="StarSymbol"/>
-              <a:buChar char="●"/>
-              <a:defRPr lang="de-DE" sz="2000" b="0" i="0" u="none" strike="noStrike" kern="1200">
-                <a:ln>
-                  <a:noFill/>
-                </a:ln>
-                <a:latin typeface="Arial" pitchFamily="18"/>
-                <a:ea typeface="Microsoft YaHei" pitchFamily="2"/>
-                <a:cs typeface="Lucida Sans" pitchFamily="2"/>
-              </a:defRPr>
-            </a:lvl7pPr>
-            <a:lvl8pPr marL="3456000" marR="0" lvl="7" indent="-216000">
-              <a:spcBef>
-                <a:spcPts val="0"/>
-              </a:spcBef>
-              <a:spcAft>
-                <a:spcPts val="283"/>
-              </a:spcAft>
-              <a:buSzPct val="45000"/>
-              <a:buFont typeface="StarSymbol"/>
-              <a:buChar char="●"/>
-              <a:defRPr lang="de-DE" sz="2000" b="0" i="0" u="none" strike="noStrike" kern="1200">
-                <a:ln>
-                  <a:noFill/>
-                </a:ln>
-                <a:latin typeface="Arial" pitchFamily="18"/>
-                <a:ea typeface="Microsoft YaHei" pitchFamily="2"/>
-                <a:cs typeface="Lucida Sans" pitchFamily="2"/>
-              </a:defRPr>
-            </a:lvl8pPr>
-            <a:lvl9pPr marL="3887999" marR="0" lvl="8" indent="-216000">
-              <a:spcBef>
-                <a:spcPts val="0"/>
-              </a:spcBef>
-              <a:spcAft>
-                <a:spcPts val="283"/>
-              </a:spcAft>
-              <a:buSzPct val="45000"/>
-              <a:buFont typeface="StarSymbol"/>
-              <a:buChar char="●"/>
-              <a:defRPr lang="de-DE" sz="2000" b="0" i="0" u="none" strike="noStrike" kern="1200">
-                <a:ln>
-                  <a:noFill/>
-                </a:ln>
-                <a:latin typeface="Arial" pitchFamily="18"/>
-                <a:ea typeface="Microsoft YaHei" pitchFamily="2"/>
-                <a:cs typeface="Lucida Sans" pitchFamily="2"/>
-              </a:defRPr>
-            </a:lvl9pPr>
-          </a:lstStyle>
-          <a:p>
-            <a:pPr lvl="0"/>
-            <a:r>
-              <a:rPr lang="de-DE" dirty="0"/>
-              <a:t>Konzept erarbeitet</a:t>
-            </a:r>
-          </a:p>
-          <a:p>
-            <a:pPr lvl="0"/>
-            <a:r>
-              <a:rPr lang="de-DE" dirty="0"/>
-              <a:t>Grobes USE Case Diagramm erstellt</a:t>
-            </a:r>
-          </a:p>
-          <a:p>
-            <a:pPr lvl="0"/>
-            <a:r>
-              <a:rPr lang="de-DE" dirty="0"/>
-              <a:t>Oberfläche erstellt</a:t>
-            </a:r>
-          </a:p>
-          <a:p>
-            <a:pPr lvl="0"/>
-            <a:r>
-              <a:rPr lang="de-DE" dirty="0"/>
-              <a:t>Datenbank angelegt</a:t>
-            </a:r>
-          </a:p>
-          <a:p>
-            <a:pPr lvl="0"/>
-            <a:r>
-              <a:rPr lang="de-DE" dirty="0"/>
-              <a:t>Fehlerbehebung</a:t>
-            </a:r>
-          </a:p>
-        </p:txBody>
-      </p:sp>
+      </p:pic>
     </p:spTree>
   </p:cSld>
   <p:clrMapOvr>
     <a:masterClrMapping/>
   </p:clrMapOvr>
-  <mc:AlternateContent xmlns:mc="http://schemas.openxmlformats.org/markup-compatibility/2006">
-    <mc:Choice xmlns:p14="http://schemas.microsoft.com/office/powerpoint/2010/main" Requires="p14">
+  <mc:AlternateContent xmlns:mc="http://schemas.openxmlformats.org/markup-compatibility/2006" xmlns:p14="http://schemas.microsoft.com/office/powerpoint/2010/main">
+    <mc:Choice Requires="p14">
       <p:transition spd="slow" p14:dur="2000"/>
     </mc:Choice>
-    <mc:Fallback>
+    <mc:Fallback xmlns="">
       <p:transition spd="slow"/>
     </mc:Fallback>
   </mc:AlternateContent>
@@ -8634,7 +9970,7 @@
 
 <file path=ppt/slides/slide9.xml><?xml version="1.0" encoding="utf-8"?>
 <p:sld xmlns:a="http://schemas.openxmlformats.org/drawingml/2006/main" xmlns:r="http://schemas.openxmlformats.org/officeDocument/2006/relationships" xmlns:p="http://schemas.openxmlformats.org/presentationml/2006/main">
-  <p:cSld name="page9">
+  <p:cSld name="page6">
     <p:spTree>
       <p:nvGrpSpPr>
         <p:cNvPr id="1" name=""/>
@@ -8766,254 +10102,48 @@
             </a:pPr>
             <a:r>
               <a:rPr lang="de-DE" b="1" dirty="0"/>
-              <a:t>Problematiken</a:t>
-            </a:r>
-          </a:p>
-        </p:txBody>
-      </p:sp>
-      <p:sp>
-        <p:nvSpPr>
-          <p:cNvPr id="3" name="Текст 2"/>
-          <p:cNvSpPr txBox="1">
-            <a:spLocks noGrp="1"/>
-          </p:cNvSpPr>
-          <p:nvPr>
-            <p:ph type="body" idx="4294967295"/>
-          </p:nvPr>
-        </p:nvSpPr>
+              <a:t>USE Case</a:t>
+            </a:r>
+          </a:p>
+        </p:txBody>
+      </p:sp>
+      <p:pic>
+        <p:nvPicPr>
+          <p:cNvPr id="3" name="Рисунок 2"/>
+          <p:cNvPicPr>
+            <a:picLocks noGrp="1" noChangeAspect="1"/>
+          </p:cNvPicPr>
+          <p:nvPr>
+            <p:ph type="pic" idx="4294967295"/>
+          </p:nvPr>
+        </p:nvPicPr>
+        <p:blipFill>
+          <a:blip r:embed="rId3">
+            <a:lum/>
+            <a:alphaModFix/>
+          </a:blip>
+          <a:srcRect/>
+          <a:stretch>
+            <a:fillRect/>
+          </a:stretch>
+        </p:blipFill>
         <p:spPr>
           <a:xfrm>
-            <a:off x="503999" y="2174973"/>
-            <a:ext cx="9071640" cy="4989240"/>
+            <a:off x="1069919" y="1979637"/>
+            <a:ext cx="7939080" cy="4989240"/>
           </a:xfrm>
         </p:spPr>
-        <p:txBody>
-          <a:bodyPr/>
-          <a:lstStyle>
-            <a:defPPr marL="432000" marR="0" lvl="0" indent="-324000">
-              <a:spcBef>
-                <a:spcPts val="0"/>
-              </a:spcBef>
-              <a:spcAft>
-                <a:spcPts val="1414"/>
-              </a:spcAft>
-              <a:buSzPct val="45000"/>
-              <a:buFont typeface="StarSymbol"/>
-              <a:buNone/>
-              <a:defRPr lang="de-DE" sz="3200" b="0" i="0" u="none" strike="noStrike" kern="1200">
-                <a:ln>
-                  <a:noFill/>
-                </a:ln>
-                <a:latin typeface="Arial" pitchFamily="18"/>
-                <a:ea typeface="Microsoft YaHei" pitchFamily="2"/>
-                <a:cs typeface="Lucida Sans" pitchFamily="2"/>
-              </a:defRPr>
-            </a:defPPr>
-            <a:lvl1pPr marL="432000" marR="0" lvl="0" indent="-324000">
-              <a:spcBef>
-                <a:spcPts val="0"/>
-              </a:spcBef>
-              <a:spcAft>
-                <a:spcPts val="1414"/>
-              </a:spcAft>
-              <a:buSzPct val="45000"/>
-              <a:buFont typeface="StarSymbol"/>
-              <a:buChar char="●"/>
-              <a:defRPr lang="de-DE" sz="3200" b="0" i="0" u="none" strike="noStrike" kern="1200">
-                <a:ln>
-                  <a:noFill/>
-                </a:ln>
-                <a:latin typeface="Arial" pitchFamily="18"/>
-                <a:ea typeface="Microsoft YaHei" pitchFamily="2"/>
-                <a:cs typeface="Lucida Sans" pitchFamily="2"/>
-              </a:defRPr>
-            </a:lvl1pPr>
-            <a:lvl2pPr marL="864000" marR="0" lvl="1" indent="-324000">
-              <a:spcBef>
-                <a:spcPts val="0"/>
-              </a:spcBef>
-              <a:spcAft>
-                <a:spcPts val="1134"/>
-              </a:spcAft>
-              <a:buSzPct val="75000"/>
-              <a:buFont typeface="StarSymbol"/>
-              <a:buChar char="–"/>
-              <a:defRPr lang="de-DE" sz="2800" b="0" i="0" u="none" strike="noStrike" kern="1200">
-                <a:ln>
-                  <a:noFill/>
-                </a:ln>
-                <a:latin typeface="Arial" pitchFamily="18"/>
-                <a:ea typeface="Microsoft YaHei" pitchFamily="2"/>
-                <a:cs typeface="Lucida Sans" pitchFamily="2"/>
-              </a:defRPr>
-            </a:lvl2pPr>
-            <a:lvl3pPr marL="1295999" marR="0" lvl="2" indent="-288000">
-              <a:spcBef>
-                <a:spcPts val="0"/>
-              </a:spcBef>
-              <a:spcAft>
-                <a:spcPts val="850"/>
-              </a:spcAft>
-              <a:buSzPct val="45000"/>
-              <a:buFont typeface="StarSymbol"/>
-              <a:buChar char="●"/>
-              <a:defRPr lang="de-DE" sz="2400" b="0" i="0" u="none" strike="noStrike" kern="1200">
-                <a:ln>
-                  <a:noFill/>
-                </a:ln>
-                <a:latin typeface="Arial" pitchFamily="18"/>
-                <a:ea typeface="Microsoft YaHei" pitchFamily="2"/>
-                <a:cs typeface="Lucida Sans" pitchFamily="2"/>
-              </a:defRPr>
-            </a:lvl3pPr>
-            <a:lvl4pPr marL="1728000" marR="0" lvl="3" indent="-216000">
-              <a:spcBef>
-                <a:spcPts val="0"/>
-              </a:spcBef>
-              <a:spcAft>
-                <a:spcPts val="567"/>
-              </a:spcAft>
-              <a:buSzPct val="75000"/>
-              <a:buFont typeface="StarSymbol"/>
-              <a:buChar char="–"/>
-              <a:defRPr lang="de-DE" sz="2000" b="0" i="0" u="none" strike="noStrike" kern="1200">
-                <a:ln>
-                  <a:noFill/>
-                </a:ln>
-                <a:latin typeface="Arial" pitchFamily="18"/>
-                <a:ea typeface="Microsoft YaHei" pitchFamily="2"/>
-                <a:cs typeface="Lucida Sans" pitchFamily="2"/>
-              </a:defRPr>
-            </a:lvl4pPr>
-            <a:lvl5pPr marL="2160000" marR="0" lvl="4" indent="-216000">
-              <a:spcBef>
-                <a:spcPts val="0"/>
-              </a:spcBef>
-              <a:spcAft>
-                <a:spcPts val="283"/>
-              </a:spcAft>
-              <a:buSzPct val="45000"/>
-              <a:buFont typeface="StarSymbol"/>
-              <a:buChar char="●"/>
-              <a:defRPr lang="de-DE" sz="2000" b="0" i="0" u="none" strike="noStrike" kern="1200">
-                <a:ln>
-                  <a:noFill/>
-                </a:ln>
-                <a:latin typeface="Arial" pitchFamily="18"/>
-                <a:ea typeface="Microsoft YaHei" pitchFamily="2"/>
-                <a:cs typeface="Lucida Sans" pitchFamily="2"/>
-              </a:defRPr>
-            </a:lvl5pPr>
-            <a:lvl6pPr marL="2592000" marR="0" lvl="5" indent="-216000">
-              <a:spcBef>
-                <a:spcPts val="0"/>
-              </a:spcBef>
-              <a:spcAft>
-                <a:spcPts val="283"/>
-              </a:spcAft>
-              <a:buSzPct val="45000"/>
-              <a:buFont typeface="StarSymbol"/>
-              <a:buChar char="●"/>
-              <a:defRPr lang="de-DE" sz="2000" b="0" i="0" u="none" strike="noStrike" kern="1200">
-                <a:ln>
-                  <a:noFill/>
-                </a:ln>
-                <a:latin typeface="Arial" pitchFamily="18"/>
-                <a:ea typeface="Microsoft YaHei" pitchFamily="2"/>
-                <a:cs typeface="Lucida Sans" pitchFamily="2"/>
-              </a:defRPr>
-            </a:lvl6pPr>
-            <a:lvl7pPr marL="3024000" marR="0" lvl="6" indent="-216000">
-              <a:spcBef>
-                <a:spcPts val="0"/>
-              </a:spcBef>
-              <a:spcAft>
-                <a:spcPts val="283"/>
-              </a:spcAft>
-              <a:buSzPct val="45000"/>
-              <a:buFont typeface="StarSymbol"/>
-              <a:buChar char="●"/>
-              <a:defRPr lang="de-DE" sz="2000" b="0" i="0" u="none" strike="noStrike" kern="1200">
-                <a:ln>
-                  <a:noFill/>
-                </a:ln>
-                <a:latin typeface="Arial" pitchFamily="18"/>
-                <a:ea typeface="Microsoft YaHei" pitchFamily="2"/>
-                <a:cs typeface="Lucida Sans" pitchFamily="2"/>
-              </a:defRPr>
-            </a:lvl7pPr>
-            <a:lvl8pPr marL="3456000" marR="0" lvl="7" indent="-216000">
-              <a:spcBef>
-                <a:spcPts val="0"/>
-              </a:spcBef>
-              <a:spcAft>
-                <a:spcPts val="283"/>
-              </a:spcAft>
-              <a:buSzPct val="45000"/>
-              <a:buFont typeface="StarSymbol"/>
-              <a:buChar char="●"/>
-              <a:defRPr lang="de-DE" sz="2000" b="0" i="0" u="none" strike="noStrike" kern="1200">
-                <a:ln>
-                  <a:noFill/>
-                </a:ln>
-                <a:latin typeface="Arial" pitchFamily="18"/>
-                <a:ea typeface="Microsoft YaHei" pitchFamily="2"/>
-                <a:cs typeface="Lucida Sans" pitchFamily="2"/>
-              </a:defRPr>
-            </a:lvl8pPr>
-            <a:lvl9pPr marL="3887999" marR="0" lvl="8" indent="-216000">
-              <a:spcBef>
-                <a:spcPts val="0"/>
-              </a:spcBef>
-              <a:spcAft>
-                <a:spcPts val="283"/>
-              </a:spcAft>
-              <a:buSzPct val="45000"/>
-              <a:buFont typeface="StarSymbol"/>
-              <a:buChar char="●"/>
-              <a:defRPr lang="de-DE" sz="2000" b="0" i="0" u="none" strike="noStrike" kern="1200">
-                <a:ln>
-                  <a:noFill/>
-                </a:ln>
-                <a:latin typeface="Arial" pitchFamily="18"/>
-                <a:ea typeface="Microsoft YaHei" pitchFamily="2"/>
-                <a:cs typeface="Lucida Sans" pitchFamily="2"/>
-              </a:defRPr>
-            </a:lvl9pPr>
-          </a:lstStyle>
-          <a:p>
-            <a:pPr lvl="0"/>
-            <a:r>
-              <a:rPr lang="de-DE" dirty="0"/>
-              <a:t>Verschiedene Forms</a:t>
-            </a:r>
-          </a:p>
-          <a:p>
-            <a:pPr lvl="0"/>
-            <a:r>
-              <a:rPr lang="de-DE" dirty="0"/>
-              <a:t>Bug-fixes (UI, SQL-Statement)</a:t>
-            </a:r>
-          </a:p>
-          <a:p>
-            <a:pPr lvl="0"/>
-            <a:r>
-              <a:rPr lang="de-DE" dirty="0"/>
-              <a:t>DB Schnittstelle</a:t>
-            </a:r>
-          </a:p>
-        </p:txBody>
-      </p:sp>
+      </p:pic>
     </p:spTree>
   </p:cSld>
   <p:clrMapOvr>
     <a:masterClrMapping/>
   </p:clrMapOvr>
-  <mc:AlternateContent xmlns:mc="http://schemas.openxmlformats.org/markup-compatibility/2006">
-    <mc:Choice xmlns:p14="http://schemas.microsoft.com/office/powerpoint/2010/main" Requires="p14">
+  <mc:AlternateContent xmlns:mc="http://schemas.openxmlformats.org/markup-compatibility/2006" xmlns:p14="http://schemas.microsoft.com/office/powerpoint/2010/main">
+    <mc:Choice Requires="p14">
       <p:transition spd="slow" p14:dur="2000"/>
     </mc:Choice>
-    <mc:Fallback>
+    <mc:Fallback xmlns="">
       <p:transition spd="slow"/>
     </mc:Fallback>
   </mc:AlternateContent>

</xml_diff>